<commit_message>
Added URLs to test locations
</commit_message>
<xml_diff>
--- a/LDDTesting/stone-LDDTestingPrinciples.pptx
+++ b/LDDTesting/stone-LDDTestingPrinciples.pptx
@@ -3198,7 +3198,7 @@
             </a:pPr>
             <a:r>
               <a:rPr/>
-              <a:t>2021-02-10</a:t>
+              <a:t>2022-03-23</a:t>
             </a:r>
           </a:p>
         </p:txBody>
@@ -3250,6 +3250,33 @@
           </a:p>
         </p:txBody>
       </p:sp>
+      <p:sp>
+        <p:nvSpPr>
+          <p:cNvPr id="3" name="Content Placeholder 2"/>
+          <p:cNvSpPr>
+            <a:spLocks noGrp="1"/>
+          </p:cNvSpPr>
+          <p:nvPr>
+            <p:ph idx="1"/>
+          </p:nvPr>
+        </p:nvSpPr>
+        <p:spPr/>
+        <p:txBody>
+          <a:bodyPr/>
+          <a:lstStyle/>
+          <a:p>
+            <a:pPr lvl="0" indent="0" marL="0">
+              <a:buNone/>
+            </a:pPr>
+            <a:r>
+              <a:rPr>
+                <a:hlinkClick r:id="rId2"/>
+              </a:rPr>
+              <a:t>https://github.com/pds-data-dictionaries/ldd-disp/tree/main/test</a:t>
+            </a:r>
+          </a:p>
+        </p:txBody>
+      </p:sp>
     </p:spTree>
   </p:cSld>
 </p:sld>
@@ -3605,6 +3632,33 @@
           </a:p>
         </p:txBody>
       </p:sp>
+      <p:sp>
+        <p:nvSpPr>
+          <p:cNvPr id="3" name="Content Placeholder 2"/>
+          <p:cNvSpPr>
+            <a:spLocks noGrp="1"/>
+          </p:cNvSpPr>
+          <p:nvPr>
+            <p:ph idx="1"/>
+          </p:nvPr>
+        </p:nvSpPr>
+        <p:spPr/>
+        <p:txBody>
+          <a:bodyPr/>
+          <a:lstStyle/>
+          <a:p>
+            <a:pPr lvl="0" indent="0" marL="0">
+              <a:buNone/>
+            </a:pPr>
+            <a:r>
+              <a:rPr>
+                <a:hlinkClick r:id="rId2"/>
+              </a:rPr>
+              <a:t>https://github.com/pds-data-dictionaries/ldd-survey/tree/main/test</a:t>
+            </a:r>
+          </a:p>
+        </p:txBody>
+      </p:sp>
     </p:spTree>
   </p:cSld>
 </p:sld>
@@ -3889,6 +3943,33 @@
           </a:p>
         </p:txBody>
       </p:sp>
+      <p:sp>
+        <p:nvSpPr>
+          <p:cNvPr id="3" name="Content Placeholder 2"/>
+          <p:cNvSpPr>
+            <a:spLocks noGrp="1"/>
+          </p:cNvSpPr>
+          <p:nvPr>
+            <p:ph idx="1"/>
+          </p:nvPr>
+        </p:nvSpPr>
+        <p:spPr/>
+        <p:txBody>
+          <a:bodyPr/>
+          <a:lstStyle/>
+          <a:p>
+            <a:pPr lvl="0" indent="0" marL="0">
+              <a:buNone/>
+            </a:pPr>
+            <a:r>
+              <a:rPr>
+                <a:hlinkClick r:id="rId2"/>
+              </a:rPr>
+              <a:t>https://github.com/pds-data-dictionaries/ldd-spectral/tree/main/test</a:t>
+            </a:r>
+          </a:p>
+        </p:txBody>
+      </p:sp>
     </p:spTree>
   </p:cSld>
 </p:sld>
@@ -4423,6 +4504,33 @@
             <a:r>
               <a:rPr/>
               <a:t>Demonstration - Nucspec Dictionary Tests</a:t>
+            </a:r>
+          </a:p>
+        </p:txBody>
+      </p:sp>
+      <p:sp>
+        <p:nvSpPr>
+          <p:cNvPr id="3" name="Content Placeholder 2"/>
+          <p:cNvSpPr>
+            <a:spLocks noGrp="1"/>
+          </p:cNvSpPr>
+          <p:nvPr>
+            <p:ph idx="1"/>
+          </p:nvPr>
+        </p:nvSpPr>
+        <p:spPr/>
+        <p:txBody>
+          <a:bodyPr/>
+          <a:lstStyle/>
+          <a:p>
+            <a:pPr lvl="0" indent="0" marL="0">
+              <a:buNone/>
+            </a:pPr>
+            <a:r>
+              <a:rPr>
+                <a:hlinkClick r:id="rId2"/>
+              </a:rPr>
+              <a:t>https://github.com/pds-data-dictionaries/ldd-nucspec/tree/main/test</a:t>
             </a:r>
           </a:p>
         </p:txBody>

</xml_diff>

<commit_message>
Added qr codes for all of the links
</commit_message>
<xml_diff>
--- a/LDDTesting/stone-LDDTestingPrinciples.pptx
+++ b/LDDTesting/stone-LDDTestingPrinciples.pptx
@@ -32,6 +32,8 @@
     <p:sldId id="280" r:id="rId26"/>
     <p:sldId id="281" r:id="rId27"/>
     <p:sldId id="282" r:id="rId28"/>
+    <p:sldId id="283" r:id="rId29"/>
+    <p:sldId id="284" r:id="rId30"/>
   </p:sldIdLst>
   <p:sldSz cx="9144000" cy="5143500" type="screen16x9"/>
   <p:notesSz cx="6858000" cy="9144000"/>
@@ -3235,7 +3237,12 @@
             <p:ph type="title"/>
           </p:nvPr>
         </p:nvSpPr>
-        <p:spPr/>
+        <p:spPr>
+          <a:xfrm>
+            <a:off x="457201" y="204787"/>
+            <a:ext cx="3008313" cy="871538"/>
+          </a:xfrm>
+        </p:spPr>
         <p:txBody>
           <a:bodyPr/>
           <a:lstStyle/>
@@ -3252,12 +3259,12 @@
       </p:sp>
       <p:sp>
         <p:nvSpPr>
-          <p:cNvPr id="3" name="Content Placeholder 2"/>
-          <p:cNvSpPr>
-            <a:spLocks noGrp="1"/>
-          </p:cNvSpPr>
-          <p:nvPr>
-            <p:ph idx="1"/>
+          <p:cNvPr id="4" name="Text Placeholder 3"/>
+          <p:cNvSpPr>
+            <a:spLocks noGrp="1"/>
+          </p:cNvSpPr>
+          <p:nvPr>
+            <p:ph idx="2" sz="half" type="body"/>
           </p:nvPr>
         </p:nvSpPr>
         <p:spPr/>
@@ -3273,6 +3280,66 @@
                 <a:hlinkClick r:id="rId2"/>
               </a:rPr>
               <a:t>https://github.com/pds-data-dictionaries/ldd-disp/tree/main/test</a:t>
+            </a:r>
+          </a:p>
+        </p:txBody>
+      </p:sp>
+      <p:pic>
+        <p:nvPicPr>
+          <p:cNvPr descr="fig:  images/qr/ldd-disp.png" id="0" name="Picture 1"/>
+          <p:cNvPicPr>
+            <a:picLocks noGrp="1" noChangeAspect="1"/>
+          </p:cNvPicPr>
+          <p:nvPr/>
+        </p:nvPicPr>
+        <p:blipFill>
+          <a:blip r:embed="rId3"/>
+          <a:stretch>
+            <a:fillRect/>
+          </a:stretch>
+        </p:blipFill>
+        <p:spPr bwMode="auto">
+          <a:xfrm>
+            <a:off x="4191000" y="203200"/>
+            <a:ext cx="3873500" cy="3873500"/>
+          </a:xfrm>
+          <a:prstGeom prst="rect">
+            <a:avLst/>
+          </a:prstGeom>
+          <a:noFill/>
+          <a:ln w="9525">
+            <a:noFill/>
+            <a:headEnd/>
+            <a:tailEnd/>
+          </a:ln>
+        </p:spPr>
+      </p:pic>
+      <p:sp>
+        <p:nvSpPr>
+          <p:cNvPr id="1" name="TextBox 3"/>
+          <p:cNvSpPr txBox="1"/>
+          <p:nvPr/>
+        </p:nvSpPr>
+        <p:spPr>
+          <a:xfrm>
+            <a:off x="3568700" y="4076700"/>
+            <a:ext cx="5105400" cy="508000"/>
+          </a:xfrm>
+          <a:prstGeom prst="rect">
+            <a:avLst/>
+          </a:prstGeom>
+          <a:noFill/>
+        </p:spPr>
+        <p:txBody>
+          <a:bodyPr/>
+          <a:lstStyle/>
+          <a:p>
+            <a:pPr lvl="0" indent="0" marL="0" algn="ctr">
+              <a:buNone/>
+            </a:pPr>
+            <a:r>
+              <a:rPr/>
+              <a:t>ldd-disp</a:t>
             </a:r>
           </a:p>
         </p:txBody>
@@ -3617,7 +3684,12 @@
             <p:ph type="title"/>
           </p:nvPr>
         </p:nvSpPr>
-        <p:spPr/>
+        <p:spPr>
+          <a:xfrm>
+            <a:off x="457201" y="204787"/>
+            <a:ext cx="3008313" cy="871538"/>
+          </a:xfrm>
+        </p:spPr>
         <p:txBody>
           <a:bodyPr/>
           <a:lstStyle/>
@@ -3634,12 +3706,12 @@
       </p:sp>
       <p:sp>
         <p:nvSpPr>
-          <p:cNvPr id="3" name="Content Placeholder 2"/>
-          <p:cNvSpPr>
-            <a:spLocks noGrp="1"/>
-          </p:cNvSpPr>
-          <p:nvPr>
-            <p:ph idx="1"/>
+          <p:cNvPr id="4" name="Text Placeholder 3"/>
+          <p:cNvSpPr>
+            <a:spLocks noGrp="1"/>
+          </p:cNvSpPr>
+          <p:nvPr>
+            <p:ph idx="2" sz="half" type="body"/>
           </p:nvPr>
         </p:nvSpPr>
         <p:spPr/>
@@ -3655,6 +3727,66 @@
                 <a:hlinkClick r:id="rId2"/>
               </a:rPr>
               <a:t>https://github.com/pds-data-dictionaries/ldd-survey/tree/main/test</a:t>
+            </a:r>
+          </a:p>
+        </p:txBody>
+      </p:sp>
+      <p:pic>
+        <p:nvPicPr>
+          <p:cNvPr descr="fig:  images/qr/ldd-survey.png" id="0" name="Picture 1"/>
+          <p:cNvPicPr>
+            <a:picLocks noGrp="1" noChangeAspect="1"/>
+          </p:cNvPicPr>
+          <p:nvPr/>
+        </p:nvPicPr>
+        <p:blipFill>
+          <a:blip r:embed="rId3"/>
+          <a:stretch>
+            <a:fillRect/>
+          </a:stretch>
+        </p:blipFill>
+        <p:spPr bwMode="auto">
+          <a:xfrm>
+            <a:off x="4191000" y="203200"/>
+            <a:ext cx="3873500" cy="3873500"/>
+          </a:xfrm>
+          <a:prstGeom prst="rect">
+            <a:avLst/>
+          </a:prstGeom>
+          <a:noFill/>
+          <a:ln w="9525">
+            <a:noFill/>
+            <a:headEnd/>
+            <a:tailEnd/>
+          </a:ln>
+        </p:spPr>
+      </p:pic>
+      <p:sp>
+        <p:nvSpPr>
+          <p:cNvPr id="1" name="TextBox 3"/>
+          <p:cNvSpPr txBox="1"/>
+          <p:nvPr/>
+        </p:nvSpPr>
+        <p:spPr>
+          <a:xfrm>
+            <a:off x="3568700" y="4076700"/>
+            <a:ext cx="5105400" cy="508000"/>
+          </a:xfrm>
+          <a:prstGeom prst="rect">
+            <a:avLst/>
+          </a:prstGeom>
+          <a:noFill/>
+        </p:spPr>
+        <p:txBody>
+          <a:bodyPr/>
+          <a:lstStyle/>
+          <a:p>
+            <a:pPr lvl="0" indent="0" marL="0" algn="ctr">
+              <a:buNone/>
+            </a:pPr>
+            <a:r>
+              <a:rPr/>
+              <a:t>ldd-survey</a:t>
             </a:r>
           </a:p>
         </p:txBody>
@@ -3928,7 +4060,12 @@
             <p:ph type="title"/>
           </p:nvPr>
         </p:nvSpPr>
-        <p:spPr/>
+        <p:spPr>
+          <a:xfrm>
+            <a:off x="457201" y="204787"/>
+            <a:ext cx="3008313" cy="871538"/>
+          </a:xfrm>
+        </p:spPr>
         <p:txBody>
           <a:bodyPr/>
           <a:lstStyle/>
@@ -3945,12 +4082,12 @@
       </p:sp>
       <p:sp>
         <p:nvSpPr>
-          <p:cNvPr id="3" name="Content Placeholder 2"/>
-          <p:cNvSpPr>
-            <a:spLocks noGrp="1"/>
-          </p:cNvSpPr>
-          <p:nvPr>
-            <p:ph idx="1"/>
+          <p:cNvPr id="4" name="Text Placeholder 3"/>
+          <p:cNvSpPr>
+            <a:spLocks noGrp="1"/>
+          </p:cNvSpPr>
+          <p:nvPr>
+            <p:ph idx="2" sz="half" type="body"/>
           </p:nvPr>
         </p:nvSpPr>
         <p:spPr/>
@@ -3966,6 +4103,66 @@
                 <a:hlinkClick r:id="rId2"/>
               </a:rPr>
               <a:t>https://github.com/pds-data-dictionaries/ldd-spectral/tree/main/test</a:t>
+            </a:r>
+          </a:p>
+        </p:txBody>
+      </p:sp>
+      <p:pic>
+        <p:nvPicPr>
+          <p:cNvPr descr="fig:  images/qr/ldd-spectral.png" id="0" name="Picture 1"/>
+          <p:cNvPicPr>
+            <a:picLocks noGrp="1" noChangeAspect="1"/>
+          </p:cNvPicPr>
+          <p:nvPr/>
+        </p:nvPicPr>
+        <p:blipFill>
+          <a:blip r:embed="rId3"/>
+          <a:stretch>
+            <a:fillRect/>
+          </a:stretch>
+        </p:blipFill>
+        <p:spPr bwMode="auto">
+          <a:xfrm>
+            <a:off x="4191000" y="203200"/>
+            <a:ext cx="3873500" cy="3873500"/>
+          </a:xfrm>
+          <a:prstGeom prst="rect">
+            <a:avLst/>
+          </a:prstGeom>
+          <a:noFill/>
+          <a:ln w="9525">
+            <a:noFill/>
+            <a:headEnd/>
+            <a:tailEnd/>
+          </a:ln>
+        </p:spPr>
+      </p:pic>
+      <p:sp>
+        <p:nvSpPr>
+          <p:cNvPr id="1" name="TextBox 3"/>
+          <p:cNvSpPr txBox="1"/>
+          <p:nvPr/>
+        </p:nvSpPr>
+        <p:spPr>
+          <a:xfrm>
+            <a:off x="3568700" y="4076700"/>
+            <a:ext cx="5105400" cy="508000"/>
+          </a:xfrm>
+          <a:prstGeom prst="rect">
+            <a:avLst/>
+          </a:prstGeom>
+          <a:noFill/>
+        </p:spPr>
+        <p:txBody>
+          <a:bodyPr/>
+          <a:lstStyle/>
+          <a:p>
+            <a:pPr lvl="0" indent="0" marL="0" algn="ctr">
+              <a:buNone/>
+            </a:pPr>
+            <a:r>
+              <a:rPr/>
+              <a:t>ldd-spectral</a:t>
             </a:r>
           </a:p>
         </p:txBody>
@@ -4493,7 +4690,12 @@
             <p:ph type="title"/>
           </p:nvPr>
         </p:nvSpPr>
-        <p:spPr/>
+        <p:spPr>
+          <a:xfrm>
+            <a:off x="457201" y="204787"/>
+            <a:ext cx="3008313" cy="871538"/>
+          </a:xfrm>
+        </p:spPr>
         <p:txBody>
           <a:bodyPr/>
           <a:lstStyle/>
@@ -4510,12 +4712,12 @@
       </p:sp>
       <p:sp>
         <p:nvSpPr>
-          <p:cNvPr id="3" name="Content Placeholder 2"/>
-          <p:cNvSpPr>
-            <a:spLocks noGrp="1"/>
-          </p:cNvSpPr>
-          <p:nvPr>
-            <p:ph idx="1"/>
+          <p:cNvPr id="4" name="Text Placeholder 3"/>
+          <p:cNvSpPr>
+            <a:spLocks noGrp="1"/>
+          </p:cNvSpPr>
+          <p:nvPr>
+            <p:ph idx="2" sz="half" type="body"/>
           </p:nvPr>
         </p:nvSpPr>
         <p:spPr/>
@@ -4531,6 +4733,66 @@
                 <a:hlinkClick r:id="rId2"/>
               </a:rPr>
               <a:t>https://github.com/pds-data-dictionaries/ldd-nucspec/tree/main/test</a:t>
+            </a:r>
+          </a:p>
+        </p:txBody>
+      </p:sp>
+      <p:pic>
+        <p:nvPicPr>
+          <p:cNvPr descr="fig:  images/qr/ldd-nucspec.png" id="0" name="Picture 1"/>
+          <p:cNvPicPr>
+            <a:picLocks noGrp="1" noChangeAspect="1"/>
+          </p:cNvPicPr>
+          <p:nvPr/>
+        </p:nvPicPr>
+        <p:blipFill>
+          <a:blip r:embed="rId3"/>
+          <a:stretch>
+            <a:fillRect/>
+          </a:stretch>
+        </p:blipFill>
+        <p:spPr bwMode="auto">
+          <a:xfrm>
+            <a:off x="4191000" y="203200"/>
+            <a:ext cx="3873500" cy="3873500"/>
+          </a:xfrm>
+          <a:prstGeom prst="rect">
+            <a:avLst/>
+          </a:prstGeom>
+          <a:noFill/>
+          <a:ln w="9525">
+            <a:noFill/>
+            <a:headEnd/>
+            <a:tailEnd/>
+          </a:ln>
+        </p:spPr>
+      </p:pic>
+      <p:sp>
+        <p:nvSpPr>
+          <p:cNvPr id="1" name="TextBox 3"/>
+          <p:cNvSpPr txBox="1"/>
+          <p:nvPr/>
+        </p:nvSpPr>
+        <p:spPr>
+          <a:xfrm>
+            <a:off x="3568700" y="4076700"/>
+            <a:ext cx="5105400" cy="508000"/>
+          </a:xfrm>
+          <a:prstGeom prst="rect">
+            <a:avLst/>
+          </a:prstGeom>
+          <a:noFill/>
+        </p:spPr>
+        <p:txBody>
+          <a:bodyPr/>
+          <a:lstStyle/>
+          <a:p>
+            <a:pPr lvl="0" indent="0" marL="0" algn="ctr">
+              <a:buNone/>
+            </a:pPr>
+            <a:r>
+              <a:rPr/>
+              <a:t>ldd-nucspec</a:t>
             </a:r>
           </a:p>
         </p:txBody>
@@ -4806,6 +5068,278 @@
             <a:r>
               <a:rPr/>
               <a:t>These should be run before the regression tests, since errors at this point are easier to catch, and some of them will prevent the dictionary from being generated, or will prevent regression tests from passing.</a:t>
+            </a:r>
+          </a:p>
+        </p:txBody>
+      </p:sp>
+    </p:spTree>
+  </p:cSld>
+</p:sld>
+</file>
+
+<file path=ppt/slides/slide28.xml><?xml version="1.0" encoding="utf-8"?>
+<p:sld xmlns:a="http://schemas.openxmlformats.org/drawingml/2006/main" xmlns:r="http://schemas.openxmlformats.org/officeDocument/2006/relationships" xmlns:p="http://schemas.openxmlformats.org/presentationml/2006/main">
+  <p:cSld>
+    <p:spTree>
+      <p:nvGrpSpPr>
+        <p:cNvPr id="1" name=""/>
+        <p:cNvGrpSpPr/>
+        <p:nvPr/>
+      </p:nvGrpSpPr>
+      <p:grpSpPr>
+        <a:xfrm>
+          <a:off x="0" y="0"/>
+          <a:ext cx="0" cy="0"/>
+          <a:chOff x="0" y="0"/>
+          <a:chExt cx="0" cy="0"/>
+        </a:xfrm>
+      </p:grpSpPr>
+      <p:sp>
+        <p:nvSpPr>
+          <p:cNvPr id="2" name="Title 1"/>
+          <p:cNvSpPr>
+            <a:spLocks noGrp="1"/>
+          </p:cNvSpPr>
+          <p:nvPr>
+            <p:ph type="title"/>
+          </p:nvPr>
+        </p:nvSpPr>
+        <p:spPr>
+          <a:xfrm>
+            <a:off x="457201" y="204787"/>
+            <a:ext cx="3008313" cy="871538"/>
+          </a:xfrm>
+        </p:spPr>
+        <p:txBody>
+          <a:bodyPr/>
+          <a:lstStyle/>
+          <a:p>
+            <a:pPr lvl="0" indent="0" marL="0">
+              <a:buNone/>
+            </a:pPr>
+            <a:r>
+              <a:rPr/>
+              <a:t>Access this presentation</a:t>
+            </a:r>
+          </a:p>
+        </p:txBody>
+      </p:sp>
+      <p:sp>
+        <p:nvSpPr>
+          <p:cNvPr id="4" name="Text Placeholder 3"/>
+          <p:cNvSpPr>
+            <a:spLocks noGrp="1"/>
+          </p:cNvSpPr>
+          <p:nvPr>
+            <p:ph idx="2" sz="half" type="body"/>
+          </p:nvPr>
+        </p:nvSpPr>
+        <p:spPr/>
+        <p:txBody>
+          <a:bodyPr/>
+          <a:lstStyle/>
+          <a:p>
+            <a:pPr lvl="0" indent="0" marL="0">
+              <a:spcBef>
+                <a:spcPts val="3000"/>
+              </a:spcBef>
+              <a:buNone/>
+            </a:pPr>
+            <a:r>
+              <a:rPr b="1"/>
+              <a:t>HTML</a:t>
+            </a:r>
+          </a:p>
+          <a:p>
+            <a:pPr lvl="0" indent="0" marL="0">
+              <a:buNone/>
+            </a:pPr>
+            <a:r>
+              <a:rPr>
+                <a:hlinkClick r:id="rId2"/>
+              </a:rPr>
+              <a:t>https://sbn-psi.github.io/dmsp/LDDTesting/LDDTestingPrinciples</a:t>
+            </a:r>
+          </a:p>
+        </p:txBody>
+      </p:sp>
+      <p:pic>
+        <p:nvPicPr>
+          <p:cNvPr descr="fig:  images/qr/site.png" id="0" name="Picture 1"/>
+          <p:cNvPicPr>
+            <a:picLocks noGrp="1" noChangeAspect="1"/>
+          </p:cNvPicPr>
+          <p:nvPr/>
+        </p:nvPicPr>
+        <p:blipFill>
+          <a:blip r:embed="rId3"/>
+          <a:stretch>
+            <a:fillRect/>
+          </a:stretch>
+        </p:blipFill>
+        <p:spPr bwMode="auto">
+          <a:xfrm>
+            <a:off x="4191000" y="203200"/>
+            <a:ext cx="3873500" cy="3873500"/>
+          </a:xfrm>
+          <a:prstGeom prst="rect">
+            <a:avLst/>
+          </a:prstGeom>
+          <a:noFill/>
+          <a:ln w="9525">
+            <a:noFill/>
+            <a:headEnd/>
+            <a:tailEnd/>
+          </a:ln>
+        </p:spPr>
+      </p:pic>
+      <p:sp>
+        <p:nvSpPr>
+          <p:cNvPr id="1" name="TextBox 3"/>
+          <p:cNvSpPr txBox="1"/>
+          <p:nvPr/>
+        </p:nvSpPr>
+        <p:spPr>
+          <a:xfrm>
+            <a:off x="3568700" y="4076700"/>
+            <a:ext cx="5105400" cy="508000"/>
+          </a:xfrm>
+          <a:prstGeom prst="rect">
+            <a:avLst/>
+          </a:prstGeom>
+          <a:noFill/>
+        </p:spPr>
+        <p:txBody>
+          <a:bodyPr/>
+          <a:lstStyle/>
+          <a:p>
+            <a:pPr lvl="0" indent="0" marL="0" algn="ctr">
+              <a:buNone/>
+            </a:pPr>
+            <a:r>
+              <a:rPr/>
+              <a:t>HTML</a:t>
+            </a:r>
+          </a:p>
+        </p:txBody>
+      </p:sp>
+    </p:spTree>
+  </p:cSld>
+</p:sld>
+</file>
+
+<file path=ppt/slides/slide29.xml><?xml version="1.0" encoding="utf-8"?>
+<p:sld xmlns:a="http://schemas.openxmlformats.org/drawingml/2006/main" xmlns:r="http://schemas.openxmlformats.org/officeDocument/2006/relationships" xmlns:p="http://schemas.openxmlformats.org/presentationml/2006/main">
+  <p:cSld>
+    <p:spTree>
+      <p:nvGrpSpPr>
+        <p:cNvPr id="1" name=""/>
+        <p:cNvGrpSpPr/>
+        <p:nvPr/>
+      </p:nvGrpSpPr>
+      <p:grpSpPr>
+        <a:xfrm>
+          <a:off x="0" y="0"/>
+          <a:ext cx="0" cy="0"/>
+          <a:chOff x="0" y="0"/>
+          <a:chExt cx="0" cy="0"/>
+        </a:xfrm>
+      </p:grpSpPr>
+      <p:sp>
+        <p:nvSpPr>
+          <p:cNvPr id="4" name="Text Placeholder 3"/>
+          <p:cNvSpPr>
+            <a:spLocks noGrp="1"/>
+          </p:cNvSpPr>
+          <p:nvPr>
+            <p:ph idx="2" sz="half" type="body"/>
+          </p:nvPr>
+        </p:nvSpPr>
+        <p:spPr/>
+        <p:txBody>
+          <a:bodyPr/>
+          <a:lstStyle/>
+          <a:p>
+            <a:pPr lvl="0" indent="0" marL="0">
+              <a:spcBef>
+                <a:spcPts val="3000"/>
+              </a:spcBef>
+              <a:buNone/>
+            </a:pPr>
+            <a:r>
+              <a:rPr b="1"/>
+              <a:t>PPT</a:t>
+            </a:r>
+          </a:p>
+          <a:p>
+            <a:pPr lvl="0" indent="0" marL="0">
+              <a:buNone/>
+            </a:pPr>
+            <a:r>
+              <a:rPr>
+                <a:hlinkClick r:id="rId2"/>
+              </a:rPr>
+              <a:t>https://github.com/sbn-psi/dmsp/raw/main/LDDTesting/stone-LDDTestingPrinciples.pptx</a:t>
+            </a:r>
+          </a:p>
+        </p:txBody>
+      </p:sp>
+      <p:pic>
+        <p:nvPicPr>
+          <p:cNvPr descr="fig:  images/qr/presentation.png" id="0" name="Picture 1"/>
+          <p:cNvPicPr>
+            <a:picLocks noGrp="1" noChangeAspect="1"/>
+          </p:cNvPicPr>
+          <p:nvPr/>
+        </p:nvPicPr>
+        <p:blipFill>
+          <a:blip r:embed="rId3"/>
+          <a:stretch>
+            <a:fillRect/>
+          </a:stretch>
+        </p:blipFill>
+        <p:spPr bwMode="auto">
+          <a:xfrm>
+            <a:off x="4191000" y="203200"/>
+            <a:ext cx="3873500" cy="3873500"/>
+          </a:xfrm>
+          <a:prstGeom prst="rect">
+            <a:avLst/>
+          </a:prstGeom>
+          <a:noFill/>
+          <a:ln w="9525">
+            <a:noFill/>
+            <a:headEnd/>
+            <a:tailEnd/>
+          </a:ln>
+        </p:spPr>
+      </p:pic>
+      <p:sp>
+        <p:nvSpPr>
+          <p:cNvPr id="1" name="TextBox 3"/>
+          <p:cNvSpPr txBox="1"/>
+          <p:nvPr/>
+        </p:nvSpPr>
+        <p:spPr>
+          <a:xfrm>
+            <a:off x="3568700" y="4076700"/>
+            <a:ext cx="5105400" cy="508000"/>
+          </a:xfrm>
+          <a:prstGeom prst="rect">
+            <a:avLst/>
+          </a:prstGeom>
+          <a:noFill/>
+        </p:spPr>
+        <p:txBody>
+          <a:bodyPr/>
+          <a:lstStyle/>
+          <a:p>
+            <a:pPr lvl="0" indent="0" marL="0" algn="ctr">
+              <a:buNone/>
+            </a:pPr>
+            <a:r>
+              <a:rPr/>
+              <a:t>PPT</a:t>
             </a:r>
           </a:p>
         </p:txBody>

</xml_diff>

<commit_message>
Added links and qr codes for ldd test generator and preflight
</commit_message>
<xml_diff>
--- a/LDDTesting/stone-LDDTestingPrinciples.pptx
+++ b/LDDTesting/stone-LDDTestingPrinciples.pptx
@@ -34,6 +34,7 @@
     <p:sldId id="282" r:id="rId28"/>
     <p:sldId id="283" r:id="rId29"/>
     <p:sldId id="284" r:id="rId30"/>
+    <p:sldId id="285" r:id="rId31"/>
   </p:sldIdLst>
   <p:sldSz cx="9144000" cy="5143500" type="screen16x9"/>
   <p:notesSz cx="6858000" cy="9144000"/>
@@ -3929,7 +3930,12 @@
             <p:ph type="title"/>
           </p:nvPr>
         </p:nvSpPr>
-        <p:spPr/>
+        <p:spPr>
+          <a:xfrm>
+            <a:off x="457201" y="204787"/>
+            <a:ext cx="3008313" cy="871538"/>
+          </a:xfrm>
+        </p:spPr>
         <p:txBody>
           <a:bodyPr/>
           <a:lstStyle/>
@@ -3940,6 +3946,93 @@
             <a:r>
               <a:rPr/>
               <a:t>Demonstration - LDD Test Generator</a:t>
+            </a:r>
+          </a:p>
+        </p:txBody>
+      </p:sp>
+      <p:sp>
+        <p:nvSpPr>
+          <p:cNvPr id="4" name="Text Placeholder 3"/>
+          <p:cNvSpPr>
+            <a:spLocks noGrp="1"/>
+          </p:cNvSpPr>
+          <p:nvPr>
+            <p:ph idx="2" sz="half" type="body"/>
+          </p:nvPr>
+        </p:nvSpPr>
+        <p:spPr/>
+        <p:txBody>
+          <a:bodyPr/>
+          <a:lstStyle/>
+          <a:p>
+            <a:pPr lvl="0" indent="0" marL="0">
+              <a:buNone/>
+            </a:pPr>
+            <a:r>
+              <a:rPr>
+                <a:hlinkClick r:id="rId2"/>
+              </a:rPr>
+              <a:t>https://github.com/sbn-psi/ldd_utilities/tree/master/LddTestGenerator</a:t>
+            </a:r>
+          </a:p>
+        </p:txBody>
+      </p:sp>
+      <p:pic>
+        <p:nvPicPr>
+          <p:cNvPr descr="fig:  images/qr/generator.png" id="0" name="Picture 1"/>
+          <p:cNvPicPr>
+            <a:picLocks noGrp="1" noChangeAspect="1"/>
+          </p:cNvPicPr>
+          <p:nvPr/>
+        </p:nvPicPr>
+        <p:blipFill>
+          <a:blip r:embed="rId3"/>
+          <a:stretch>
+            <a:fillRect/>
+          </a:stretch>
+        </p:blipFill>
+        <p:spPr bwMode="auto">
+          <a:xfrm>
+            <a:off x="4191000" y="203200"/>
+            <a:ext cx="3873500" cy="3873500"/>
+          </a:xfrm>
+          <a:prstGeom prst="rect">
+            <a:avLst/>
+          </a:prstGeom>
+          <a:noFill/>
+          <a:ln w="9525">
+            <a:noFill/>
+            <a:headEnd/>
+            <a:tailEnd/>
+          </a:ln>
+        </p:spPr>
+      </p:pic>
+      <p:sp>
+        <p:nvSpPr>
+          <p:cNvPr id="1" name="TextBox 3"/>
+          <p:cNvSpPr txBox="1"/>
+          <p:nvPr/>
+        </p:nvSpPr>
+        <p:spPr>
+          <a:xfrm>
+            <a:off x="3568700" y="4076700"/>
+            <a:ext cx="5105400" cy="508000"/>
+          </a:xfrm>
+          <a:prstGeom prst="rect">
+            <a:avLst/>
+          </a:prstGeom>
+          <a:noFill/>
+        </p:spPr>
+        <p:txBody>
+          <a:bodyPr/>
+          <a:lstStyle/>
+          <a:p>
+            <a:pPr lvl="0" indent="0" marL="0" algn="ctr">
+              <a:buNone/>
+            </a:pPr>
+            <a:r>
+              <a:rPr/>
+              <a:t>generator</a:t>
             </a:r>
           </a:p>
         </p:txBody>
@@ -5119,6 +5212,145 @@
             </a:pPr>
             <a:r>
               <a:rPr/>
+              <a:t>Demonstration - LDDPreflight</a:t>
+            </a:r>
+          </a:p>
+        </p:txBody>
+      </p:sp>
+      <p:sp>
+        <p:nvSpPr>
+          <p:cNvPr id="4" name="Text Placeholder 3"/>
+          <p:cNvSpPr>
+            <a:spLocks noGrp="1"/>
+          </p:cNvSpPr>
+          <p:nvPr>
+            <p:ph idx="2" sz="half" type="body"/>
+          </p:nvPr>
+        </p:nvSpPr>
+        <p:spPr/>
+        <p:txBody>
+          <a:bodyPr/>
+          <a:lstStyle/>
+          <a:p>
+            <a:pPr lvl="0" indent="0" marL="0">
+              <a:buNone/>
+            </a:pPr>
+            <a:r>
+              <a:rPr>
+                <a:hlinkClick r:id="rId2"/>
+              </a:rPr>
+              <a:t>https://github.com/sbn-psi/ldd_utilities/tree/master/LddPreflight</a:t>
+            </a:r>
+          </a:p>
+        </p:txBody>
+      </p:sp>
+      <p:pic>
+        <p:nvPicPr>
+          <p:cNvPr descr="fig:  images/qr/preflight.png" id="0" name="Picture 1"/>
+          <p:cNvPicPr>
+            <a:picLocks noGrp="1" noChangeAspect="1"/>
+          </p:cNvPicPr>
+          <p:nvPr/>
+        </p:nvPicPr>
+        <p:blipFill>
+          <a:blip r:embed="rId3"/>
+          <a:stretch>
+            <a:fillRect/>
+          </a:stretch>
+        </p:blipFill>
+        <p:spPr bwMode="auto">
+          <a:xfrm>
+            <a:off x="4191000" y="203200"/>
+            <a:ext cx="3873500" cy="3873500"/>
+          </a:xfrm>
+          <a:prstGeom prst="rect">
+            <a:avLst/>
+          </a:prstGeom>
+          <a:noFill/>
+          <a:ln w="9525">
+            <a:noFill/>
+            <a:headEnd/>
+            <a:tailEnd/>
+          </a:ln>
+        </p:spPr>
+      </p:pic>
+      <p:sp>
+        <p:nvSpPr>
+          <p:cNvPr id="1" name="TextBox 3"/>
+          <p:cNvSpPr txBox="1"/>
+          <p:nvPr/>
+        </p:nvSpPr>
+        <p:spPr>
+          <a:xfrm>
+            <a:off x="3568700" y="4076700"/>
+            <a:ext cx="5105400" cy="508000"/>
+          </a:xfrm>
+          <a:prstGeom prst="rect">
+            <a:avLst/>
+          </a:prstGeom>
+          <a:noFill/>
+        </p:spPr>
+        <p:txBody>
+          <a:bodyPr/>
+          <a:lstStyle/>
+          <a:p>
+            <a:pPr lvl="0" indent="0" marL="0" algn="ctr">
+              <a:buNone/>
+            </a:pPr>
+            <a:r>
+              <a:rPr/>
+              <a:t>preflight</a:t>
+            </a:r>
+          </a:p>
+        </p:txBody>
+      </p:sp>
+    </p:spTree>
+  </p:cSld>
+</p:sld>
+</file>
+
+<file path=ppt/slides/slide29.xml><?xml version="1.0" encoding="utf-8"?>
+<p:sld xmlns:a="http://schemas.openxmlformats.org/drawingml/2006/main" xmlns:r="http://schemas.openxmlformats.org/officeDocument/2006/relationships" xmlns:p="http://schemas.openxmlformats.org/presentationml/2006/main">
+  <p:cSld>
+    <p:spTree>
+      <p:nvGrpSpPr>
+        <p:cNvPr id="1" name=""/>
+        <p:cNvGrpSpPr/>
+        <p:nvPr/>
+      </p:nvGrpSpPr>
+      <p:grpSpPr>
+        <a:xfrm>
+          <a:off x="0" y="0"/>
+          <a:ext cx="0" cy="0"/>
+          <a:chOff x="0" y="0"/>
+          <a:chExt cx="0" cy="0"/>
+        </a:xfrm>
+      </p:grpSpPr>
+      <p:sp>
+        <p:nvSpPr>
+          <p:cNvPr id="2" name="Title 1"/>
+          <p:cNvSpPr>
+            <a:spLocks noGrp="1"/>
+          </p:cNvSpPr>
+          <p:nvPr>
+            <p:ph type="title"/>
+          </p:nvPr>
+        </p:nvSpPr>
+        <p:spPr>
+          <a:xfrm>
+            <a:off x="457201" y="204787"/>
+            <a:ext cx="3008313" cy="871538"/>
+          </a:xfrm>
+        </p:spPr>
+        <p:txBody>
+          <a:bodyPr/>
+          <a:lstStyle/>
+          <a:p>
+            <a:pPr lvl="0" indent="0" marL="0">
+              <a:buNone/>
+            </a:pPr>
+            <a:r>
+              <a:rPr/>
               <a:t>Access this presentation</a:t>
             </a:r>
           </a:p>
@@ -5228,7 +5460,119 @@
 </p:sld>
 </file>
 
-<file path=ppt/slides/slide29.xml><?xml version="1.0" encoding="utf-8"?>
+<file path=ppt/slides/slide3.xml><?xml version="1.0" encoding="utf-8"?>
+<p:sld xmlns:a="http://schemas.openxmlformats.org/drawingml/2006/main" xmlns:r="http://schemas.openxmlformats.org/officeDocument/2006/relationships" xmlns:p="http://schemas.openxmlformats.org/presentationml/2006/main">
+  <p:cSld>
+    <p:spTree>
+      <p:nvGrpSpPr>
+        <p:cNvPr id="1" name=""/>
+        <p:cNvGrpSpPr/>
+        <p:nvPr/>
+      </p:nvGrpSpPr>
+      <p:grpSpPr>
+        <a:xfrm>
+          <a:off x="0" y="0"/>
+          <a:ext cx="0" cy="0"/>
+          <a:chOff x="0" y="0"/>
+          <a:chExt cx="0" cy="0"/>
+        </a:xfrm>
+      </p:grpSpPr>
+      <p:sp>
+        <p:nvSpPr>
+          <p:cNvPr id="2" name="Title 1"/>
+          <p:cNvSpPr>
+            <a:spLocks noGrp="1"/>
+          </p:cNvSpPr>
+          <p:nvPr>
+            <p:ph type="title"/>
+          </p:nvPr>
+        </p:nvSpPr>
+        <p:spPr/>
+        <p:txBody>
+          <a:bodyPr/>
+          <a:lstStyle/>
+          <a:p>
+            <a:pPr lvl="0" indent="0" marL="0">
+              <a:buNone/>
+            </a:pPr>
+            <a:r>
+              <a:rPr/>
+              <a:t>Testing methodologies</a:t>
+            </a:r>
+          </a:p>
+        </p:txBody>
+      </p:sp>
+      <p:sp>
+        <p:nvSpPr>
+          <p:cNvPr id="3" name="Content Placeholder 2"/>
+          <p:cNvSpPr>
+            <a:spLocks noGrp="1"/>
+          </p:cNvSpPr>
+          <p:nvPr>
+            <p:ph idx="1"/>
+          </p:nvPr>
+        </p:nvSpPr>
+        <p:spPr/>
+        <p:txBody>
+          <a:bodyPr/>
+          <a:lstStyle/>
+          <a:p>
+            <a:pPr lvl="0"/>
+            <a:r>
+              <a:rPr/>
+              <a:t>Regression testing</a:t>
+            </a:r>
+          </a:p>
+          <a:p>
+            <a:pPr lvl="1"/>
+            <a:r>
+              <a:rPr/>
+              <a:t>This method generates the dictionary, and validates special labels against the dictionary.</a:t>
+            </a:r>
+          </a:p>
+          <a:p>
+            <a:pPr lvl="2"/>
+            <a:r>
+              <a:rPr/>
+              <a:t>Thse labels are specifically designed to pass or fail validation</a:t>
+            </a:r>
+          </a:p>
+          <a:p>
+            <a:pPr lvl="2"/>
+            <a:r>
+              <a:rPr/>
+              <a:t>If the validation result does not match the intent of the label, then there is a problem with the dictionary.</a:t>
+            </a:r>
+          </a:p>
+          <a:p>
+            <a:pPr lvl="0"/>
+            <a:r>
+              <a:rPr/>
+              <a:t>Static analysis</a:t>
+            </a:r>
+          </a:p>
+          <a:p>
+            <a:pPr lvl="1"/>
+            <a:r>
+              <a:rPr/>
+              <a:t>This evaluates the dictionary according to predefined rules, without necessarily comparing it against labels.</a:t>
+            </a:r>
+          </a:p>
+          <a:p>
+            <a:pPr lvl="0"/>
+            <a:r>
+              <a:rPr/>
+              <a:t>Regression testing and static analysis are complementary tools, and both are needed to fully evaluate a dictionary.</a:t>
+            </a:r>
+          </a:p>
+        </p:txBody>
+      </p:sp>
+    </p:spTree>
+  </p:cSld>
+</p:sld>
+</file>
+
+<file path=ppt/slides/slide30.xml><?xml version="1.0" encoding="utf-8"?>
 <p:sld xmlns:a="http://schemas.openxmlformats.org/drawingml/2006/main" xmlns:r="http://schemas.openxmlformats.org/officeDocument/2006/relationships" xmlns:p="http://schemas.openxmlformats.org/presentationml/2006/main">
   <p:cSld>
     <p:spTree>
@@ -5340,118 +5684,6 @@
             <a:r>
               <a:rPr/>
               <a:t>PPT</a:t>
-            </a:r>
-          </a:p>
-        </p:txBody>
-      </p:sp>
-    </p:spTree>
-  </p:cSld>
-</p:sld>
-</file>
-
-<file path=ppt/slides/slide3.xml><?xml version="1.0" encoding="utf-8"?>
-<p:sld xmlns:a="http://schemas.openxmlformats.org/drawingml/2006/main" xmlns:r="http://schemas.openxmlformats.org/officeDocument/2006/relationships" xmlns:p="http://schemas.openxmlformats.org/presentationml/2006/main">
-  <p:cSld>
-    <p:spTree>
-      <p:nvGrpSpPr>
-        <p:cNvPr id="1" name=""/>
-        <p:cNvGrpSpPr/>
-        <p:nvPr/>
-      </p:nvGrpSpPr>
-      <p:grpSpPr>
-        <a:xfrm>
-          <a:off x="0" y="0"/>
-          <a:ext cx="0" cy="0"/>
-          <a:chOff x="0" y="0"/>
-          <a:chExt cx="0" cy="0"/>
-        </a:xfrm>
-      </p:grpSpPr>
-      <p:sp>
-        <p:nvSpPr>
-          <p:cNvPr id="2" name="Title 1"/>
-          <p:cNvSpPr>
-            <a:spLocks noGrp="1"/>
-          </p:cNvSpPr>
-          <p:nvPr>
-            <p:ph type="title"/>
-          </p:nvPr>
-        </p:nvSpPr>
-        <p:spPr/>
-        <p:txBody>
-          <a:bodyPr/>
-          <a:lstStyle/>
-          <a:p>
-            <a:pPr lvl="0" indent="0" marL="0">
-              <a:buNone/>
-            </a:pPr>
-            <a:r>
-              <a:rPr/>
-              <a:t>Testing methodologies</a:t>
-            </a:r>
-          </a:p>
-        </p:txBody>
-      </p:sp>
-      <p:sp>
-        <p:nvSpPr>
-          <p:cNvPr id="3" name="Content Placeholder 2"/>
-          <p:cNvSpPr>
-            <a:spLocks noGrp="1"/>
-          </p:cNvSpPr>
-          <p:nvPr>
-            <p:ph idx="1"/>
-          </p:nvPr>
-        </p:nvSpPr>
-        <p:spPr/>
-        <p:txBody>
-          <a:bodyPr/>
-          <a:lstStyle/>
-          <a:p>
-            <a:pPr lvl="0"/>
-            <a:r>
-              <a:rPr/>
-              <a:t>Regression testing</a:t>
-            </a:r>
-          </a:p>
-          <a:p>
-            <a:pPr lvl="1"/>
-            <a:r>
-              <a:rPr/>
-              <a:t>This method generates the dictionary, and validates special labels against the dictionary.</a:t>
-            </a:r>
-          </a:p>
-          <a:p>
-            <a:pPr lvl="2"/>
-            <a:r>
-              <a:rPr/>
-              <a:t>Thse labels are specifically designed to pass or fail validation</a:t>
-            </a:r>
-          </a:p>
-          <a:p>
-            <a:pPr lvl="2"/>
-            <a:r>
-              <a:rPr/>
-              <a:t>If the validation result does not match the intent of the label, then there is a problem with the dictionary.</a:t>
-            </a:r>
-          </a:p>
-          <a:p>
-            <a:pPr lvl="0"/>
-            <a:r>
-              <a:rPr/>
-              <a:t>Static analysis</a:t>
-            </a:r>
-          </a:p>
-          <a:p>
-            <a:pPr lvl="1"/>
-            <a:r>
-              <a:rPr/>
-              <a:t>This evaluates the dictionary according to predefined rules, without necessarily comparing it against labels.</a:t>
-            </a:r>
-          </a:p>
-          <a:p>
-            <a:pPr lvl="0"/>
-            <a:r>
-              <a:rPr/>
-              <a:t>Regression testing and static analysis are complementary tools, and both are needed to fully evaluate a dictionary.</a:t>
             </a:r>
           </a:p>
         </p:txBody>

</xml_diff>

<commit_message>
Added objectives for each ldd test suite demonstration
</commit_message>
<xml_diff>
--- a/LDDTesting/stone-LDDTestingPrinciples.pptx
+++ b/LDDTesting/stone-LDDTestingPrinciples.pptx
@@ -35,6 +35,8 @@
     <p:sldId id="283" r:id="rId29"/>
     <p:sldId id="284" r:id="rId30"/>
     <p:sldId id="285" r:id="rId31"/>
+    <p:sldId id="286" r:id="rId32"/>
+    <p:sldId id="287" r:id="rId33"/>
   </p:sldIdLst>
   <p:sldSz cx="9144000" cy="5143500" type="screen16x9"/>
   <p:notesSz cx="6858000" cy="9144000"/>
@@ -3283,6 +3285,25 @@
               <a:t>https://github.com/pds-data-dictionaries/ldd-disp/tree/main/test</a:t>
             </a:r>
           </a:p>
+          <a:p>
+            <a:pPr lvl="0" indent="0" marL="0">
+              <a:spcBef>
+                <a:spcPts val="3000"/>
+              </a:spcBef>
+              <a:buNone/>
+            </a:pPr>
+            <a:r>
+              <a:rPr b="1"/>
+              <a:t>Objectives</a:t>
+            </a:r>
+          </a:p>
+          <a:p>
+            <a:pPr lvl="0"/>
+            <a:r>
+              <a:rPr/>
+              <a:t>Demonstrate simple passing and failing tests.</a:t>
+            </a:r>
+          </a:p>
         </p:txBody>
       </p:sp>
       <p:pic>
@@ -3816,12 +3837,12 @@
       </p:grpSpPr>
       <p:sp>
         <p:nvSpPr>
-          <p:cNvPr id="2" name="Title 1"/>
-          <p:cNvSpPr>
-            <a:spLocks noGrp="1"/>
-          </p:cNvSpPr>
-          <p:nvPr>
-            <p:ph type="title"/>
+          <p:cNvPr id="3" name="Content Placeholder 2"/>
+          <p:cNvSpPr>
+            <a:spLocks noGrp="1"/>
+          </p:cNvSpPr>
+          <p:nvPr>
+            <p:ph idx="1"/>
           </p:nvPr>
         </p:nvSpPr>
         <p:spPr/>
@@ -3830,70 +3851,21 @@
           <a:lstStyle/>
           <a:p>
             <a:pPr lvl="0" indent="0" marL="0">
+              <a:spcBef>
+                <a:spcPts val="3000"/>
+              </a:spcBef>
               <a:buNone/>
             </a:pPr>
             <a:r>
-              <a:rPr/>
-              <a:t>Generating Test Labels</a:t>
-            </a:r>
-          </a:p>
-        </p:txBody>
-      </p:sp>
-      <p:sp>
-        <p:nvSpPr>
-          <p:cNvPr id="3" name="Content Placeholder 2"/>
-          <p:cNvSpPr>
-            <a:spLocks noGrp="1"/>
-          </p:cNvSpPr>
-          <p:nvPr>
-            <p:ph idx="1"/>
-          </p:nvPr>
-        </p:nvSpPr>
-        <p:spPr/>
-        <p:txBody>
-          <a:bodyPr/>
-          <a:lstStyle/>
-          <a:p>
-            <a:pPr lvl="0"/>
-            <a:r>
-              <a:rPr/>
-              <a:t>Hand writing labels</a:t>
-            </a:r>
-          </a:p>
-          <a:p>
-            <a:pPr lvl="0"/>
-            <a:r>
-              <a:rPr/>
-              <a:t>Injecting discipline area fragments into label templates</a:t>
-            </a:r>
-          </a:p>
-          <a:p>
-            <a:pPr lvl="1"/>
-            <a:r>
-              <a:rPr/>
-              <a:t>In addition to making the labels easier to generate, the parts of the label that are being tested are separated from the rest of the label.</a:t>
-            </a:r>
-          </a:p>
-          <a:p>
-            <a:pPr lvl="0"/>
-            <a:r>
-              <a:rPr/>
-              <a:t>Mutating existing labels</a:t>
-            </a:r>
-          </a:p>
-          <a:p>
-            <a:pPr lvl="1"/>
-            <a:r>
-              <a:rPr/>
-              <a:t>Keep a mapping of </a:t>
-            </a:r>
-            <a:r>
-              <a:rPr i="1"/>
-              <a:t>XPath</a:t>
-            </a:r>
-            <a:r>
-              <a:rPr/>
-              <a:t>s and operations to perform on a location</a:t>
+              <a:rPr b="1"/>
+              <a:t>Objectives</a:t>
+            </a:r>
+          </a:p>
+          <a:p>
+            <a:pPr lvl="0"/>
+            <a:r>
+              <a:rPr/>
+              <a:t>Demonstrate granular tests</a:t>
             </a:r>
           </a:p>
         </p:txBody>
@@ -3904,6 +3876,112 @@
 </file>
 
 <file path=ppt/slides/slide17.xml><?xml version="1.0" encoding="utf-8"?>
+<p:sld xmlns:a="http://schemas.openxmlformats.org/drawingml/2006/main" xmlns:r="http://schemas.openxmlformats.org/officeDocument/2006/relationships" xmlns:p="http://schemas.openxmlformats.org/presentationml/2006/main">
+  <p:cSld>
+    <p:spTree>
+      <p:nvGrpSpPr>
+        <p:cNvPr id="1" name=""/>
+        <p:cNvGrpSpPr/>
+        <p:nvPr/>
+      </p:nvGrpSpPr>
+      <p:grpSpPr>
+        <a:xfrm>
+          <a:off x="0" y="0"/>
+          <a:ext cx="0" cy="0"/>
+          <a:chOff x="0" y="0"/>
+          <a:chExt cx="0" cy="0"/>
+        </a:xfrm>
+      </p:grpSpPr>
+      <p:sp>
+        <p:nvSpPr>
+          <p:cNvPr id="2" name="Title 1"/>
+          <p:cNvSpPr>
+            <a:spLocks noGrp="1"/>
+          </p:cNvSpPr>
+          <p:nvPr>
+            <p:ph type="title"/>
+          </p:nvPr>
+        </p:nvSpPr>
+        <p:spPr/>
+        <p:txBody>
+          <a:bodyPr/>
+          <a:lstStyle/>
+          <a:p>
+            <a:pPr lvl="0" indent="0" marL="0">
+              <a:buNone/>
+            </a:pPr>
+            <a:r>
+              <a:rPr/>
+              <a:t>Generating Test Labels</a:t>
+            </a:r>
+          </a:p>
+        </p:txBody>
+      </p:sp>
+      <p:sp>
+        <p:nvSpPr>
+          <p:cNvPr id="3" name="Content Placeholder 2"/>
+          <p:cNvSpPr>
+            <a:spLocks noGrp="1"/>
+          </p:cNvSpPr>
+          <p:nvPr>
+            <p:ph idx="1"/>
+          </p:nvPr>
+        </p:nvSpPr>
+        <p:spPr/>
+        <p:txBody>
+          <a:bodyPr/>
+          <a:lstStyle/>
+          <a:p>
+            <a:pPr lvl="0"/>
+            <a:r>
+              <a:rPr/>
+              <a:t>Hand writing labels</a:t>
+            </a:r>
+          </a:p>
+          <a:p>
+            <a:pPr lvl="0"/>
+            <a:r>
+              <a:rPr/>
+              <a:t>Injecting discipline area fragments into label templates</a:t>
+            </a:r>
+          </a:p>
+          <a:p>
+            <a:pPr lvl="1"/>
+            <a:r>
+              <a:rPr/>
+              <a:t>In addition to making the labels easier to generate, the parts of the label that are being tested are separated from the rest of the label.</a:t>
+            </a:r>
+          </a:p>
+          <a:p>
+            <a:pPr lvl="0"/>
+            <a:r>
+              <a:rPr/>
+              <a:t>Mutating existing labels</a:t>
+            </a:r>
+          </a:p>
+          <a:p>
+            <a:pPr lvl="1"/>
+            <a:r>
+              <a:rPr/>
+              <a:t>Keep a mapping of </a:t>
+            </a:r>
+            <a:r>
+              <a:rPr i="1"/>
+              <a:t>XPath</a:t>
+            </a:r>
+            <a:r>
+              <a:rPr/>
+              <a:t>s and operations to perform on a location</a:t>
+            </a:r>
+          </a:p>
+        </p:txBody>
+      </p:sp>
+    </p:spTree>
+  </p:cSld>
+</p:sld>
+</file>
+
+<file path=ppt/slides/slide18.xml><?xml version="1.0" encoding="utf-8"?>
 <p:sld xmlns:a="http://schemas.openxmlformats.org/drawingml/2006/main" xmlns:r="http://schemas.openxmlformats.org/officeDocument/2006/relationships" xmlns:p="http://schemas.openxmlformats.org/presentationml/2006/main">
   <p:cSld>
     <p:spTree>
@@ -4042,90 +4120,6 @@
 </p:sld>
 </file>
 
-<file path=ppt/slides/slide18.xml><?xml version="1.0" encoding="utf-8"?>
-<p:sld xmlns:a="http://schemas.openxmlformats.org/drawingml/2006/main" xmlns:r="http://schemas.openxmlformats.org/officeDocument/2006/relationships" xmlns:p="http://schemas.openxmlformats.org/presentationml/2006/main">
-  <p:cSld>
-    <p:spTree>
-      <p:nvGrpSpPr>
-        <p:cNvPr id="1" name=""/>
-        <p:cNvGrpSpPr/>
-        <p:nvPr/>
-      </p:nvGrpSpPr>
-      <p:grpSpPr>
-        <a:xfrm>
-          <a:off x="0" y="0"/>
-          <a:ext cx="0" cy="0"/>
-          <a:chOff x="0" y="0"/>
-          <a:chExt cx="0" cy="0"/>
-        </a:xfrm>
-      </p:grpSpPr>
-      <p:sp>
-        <p:nvSpPr>
-          <p:cNvPr id="2" name="Title 1"/>
-          <p:cNvSpPr>
-            <a:spLocks noGrp="1"/>
-          </p:cNvSpPr>
-          <p:nvPr>
-            <p:ph type="title"/>
-          </p:nvPr>
-        </p:nvSpPr>
-        <p:spPr/>
-        <p:txBody>
-          <a:bodyPr/>
-          <a:lstStyle/>
-          <a:p>
-            <a:pPr lvl="0" indent="0" marL="0">
-              <a:buNone/>
-            </a:pPr>
-            <a:r>
-              <a:rPr/>
-              <a:t>Monolithic tests</a:t>
-            </a:r>
-          </a:p>
-        </p:txBody>
-      </p:sp>
-      <p:sp>
-        <p:nvSpPr>
-          <p:cNvPr id="3" name="Content Placeholder 2"/>
-          <p:cNvSpPr>
-            <a:spLocks noGrp="1"/>
-          </p:cNvSpPr>
-          <p:nvPr>
-            <p:ph idx="1"/>
-          </p:nvPr>
-        </p:nvSpPr>
-        <p:spPr/>
-        <p:txBody>
-          <a:bodyPr/>
-          <a:lstStyle/>
-          <a:p>
-            <a:pPr lvl="0"/>
-            <a:r>
-              <a:rPr/>
-              <a:t>Multiple tests can be packed into a single label</a:t>
-            </a:r>
-          </a:p>
-          <a:p>
-            <a:pPr lvl="0"/>
-            <a:r>
-              <a:rPr/>
-              <a:t>Document each point where the test is expected to fail</a:t>
-            </a:r>
-          </a:p>
-          <a:p>
-            <a:pPr lvl="0"/>
-            <a:r>
-              <a:rPr/>
-              <a:t>Examine the output of the test run to determine if there are any missed failures</a:t>
-            </a:r>
-          </a:p>
-        </p:txBody>
-      </p:sp>
-    </p:spTree>
-  </p:cSld>
-</p:sld>
-</file>
-
 <file path=ppt/slides/slide19.xml><?xml version="1.0" encoding="utf-8"?>
 <p:sld xmlns:a="http://schemas.openxmlformats.org/drawingml/2006/main" xmlns:r="http://schemas.openxmlformats.org/officeDocument/2006/relationships" xmlns:p="http://schemas.openxmlformats.org/presentationml/2006/main">
   <p:cSld>
@@ -4153,6 +4147,209 @@
             <p:ph type="title"/>
           </p:nvPr>
         </p:nvSpPr>
+        <p:spPr/>
+        <p:txBody>
+          <a:bodyPr/>
+          <a:lstStyle/>
+          <a:p>
+            <a:pPr lvl="0" indent="0" marL="0">
+              <a:buNone/>
+            </a:pPr>
+            <a:r>
+              <a:rPr/>
+              <a:t>Monolithic tests</a:t>
+            </a:r>
+          </a:p>
+        </p:txBody>
+      </p:sp>
+      <p:sp>
+        <p:nvSpPr>
+          <p:cNvPr id="3" name="Content Placeholder 2"/>
+          <p:cNvSpPr>
+            <a:spLocks noGrp="1"/>
+          </p:cNvSpPr>
+          <p:nvPr>
+            <p:ph idx="1"/>
+          </p:nvPr>
+        </p:nvSpPr>
+        <p:spPr/>
+        <p:txBody>
+          <a:bodyPr/>
+          <a:lstStyle/>
+          <a:p>
+            <a:pPr lvl="0"/>
+            <a:r>
+              <a:rPr/>
+              <a:t>Multiple tests can be packed into a single label</a:t>
+            </a:r>
+          </a:p>
+          <a:p>
+            <a:pPr lvl="0"/>
+            <a:r>
+              <a:rPr/>
+              <a:t>Document each point where the test is expected to fail</a:t>
+            </a:r>
+          </a:p>
+          <a:p>
+            <a:pPr lvl="0"/>
+            <a:r>
+              <a:rPr/>
+              <a:t>Examine the output of the test run to determine if there are any missed failures</a:t>
+            </a:r>
+          </a:p>
+        </p:txBody>
+      </p:sp>
+    </p:spTree>
+  </p:cSld>
+</p:sld>
+</file>
+
+<file path=ppt/slides/slide2.xml><?xml version="1.0" encoding="utf-8"?>
+<p:sld xmlns:a="http://schemas.openxmlformats.org/drawingml/2006/main" xmlns:r="http://schemas.openxmlformats.org/officeDocument/2006/relationships" xmlns:p="http://schemas.openxmlformats.org/presentationml/2006/main">
+  <p:cSld>
+    <p:spTree>
+      <p:nvGrpSpPr>
+        <p:cNvPr id="1" name=""/>
+        <p:cNvGrpSpPr/>
+        <p:nvPr/>
+      </p:nvGrpSpPr>
+      <p:grpSpPr>
+        <a:xfrm>
+          <a:off x="0" y="0"/>
+          <a:ext cx="0" cy="0"/>
+          <a:chOff x="0" y="0"/>
+          <a:chExt cx="0" cy="0"/>
+        </a:xfrm>
+      </p:grpSpPr>
+      <p:sp>
+        <p:nvSpPr>
+          <p:cNvPr id="2" name="Title 1"/>
+          <p:cNvSpPr>
+            <a:spLocks noGrp="1"/>
+          </p:cNvSpPr>
+          <p:nvPr>
+            <p:ph type="title"/>
+          </p:nvPr>
+        </p:nvSpPr>
+        <p:spPr/>
+        <p:txBody>
+          <a:bodyPr/>
+          <a:lstStyle/>
+          <a:p>
+            <a:pPr lvl="0" indent="0" marL="0">
+              <a:buNone/>
+            </a:pPr>
+            <a:r>
+              <a:rPr/>
+              <a:t>Why Tests?</a:t>
+            </a:r>
+          </a:p>
+        </p:txBody>
+      </p:sp>
+      <p:sp>
+        <p:nvSpPr>
+          <p:cNvPr id="3" name="Content Placeholder 2"/>
+          <p:cNvSpPr>
+            <a:spLocks noGrp="1"/>
+          </p:cNvSpPr>
+          <p:nvPr>
+            <p:ph idx="1"/>
+          </p:nvPr>
+        </p:nvSpPr>
+        <p:spPr/>
+        <p:txBody>
+          <a:bodyPr/>
+          <a:lstStyle/>
+          <a:p>
+            <a:pPr lvl="0"/>
+            <a:r>
+              <a:rPr/>
+              <a:t>Passing tests provide examples of how the dictionary is used</a:t>
+            </a:r>
+          </a:p>
+          <a:p>
+            <a:pPr lvl="1"/>
+            <a:r>
+              <a:rPr/>
+              <a:t>This is not a substitute for documentation, but can supplement it</a:t>
+            </a:r>
+          </a:p>
+          <a:p>
+            <a:pPr lvl="0"/>
+            <a:r>
+              <a:rPr/>
+              <a:t>Ensure that every class definition works as intended</a:t>
+            </a:r>
+          </a:p>
+          <a:p>
+            <a:pPr lvl="0"/>
+            <a:r>
+              <a:rPr/>
+              <a:t>Ensures that schematron tests are running</a:t>
+            </a:r>
+          </a:p>
+          <a:p>
+            <a:pPr lvl="1"/>
+            <a:r>
+              <a:rPr/>
+              <a:t>Ensures that your schematron rules are correct</a:t>
+            </a:r>
+          </a:p>
+          <a:p>
+            <a:pPr lvl="0"/>
+            <a:r>
+              <a:rPr/>
+              <a:t>Prevent regressions</a:t>
+            </a:r>
+          </a:p>
+          <a:p>
+            <a:pPr lvl="1"/>
+            <a:r>
+              <a:rPr/>
+              <a:t>Regressions are unintended side-effects created by making changes</a:t>
+            </a:r>
+          </a:p>
+          <a:p>
+            <a:pPr lvl="0"/>
+            <a:r>
+              <a:rPr/>
+              <a:t>Warns if changes are not backwards-compatible</a:t>
+            </a:r>
+          </a:p>
+        </p:txBody>
+      </p:sp>
+    </p:spTree>
+  </p:cSld>
+</p:sld>
+</file>
+
+<file path=ppt/slides/slide20.xml><?xml version="1.0" encoding="utf-8"?>
+<p:sld xmlns:a="http://schemas.openxmlformats.org/drawingml/2006/main" xmlns:r="http://schemas.openxmlformats.org/officeDocument/2006/relationships" xmlns:p="http://schemas.openxmlformats.org/presentationml/2006/main">
+  <p:cSld>
+    <p:spTree>
+      <p:nvGrpSpPr>
+        <p:cNvPr id="1" name=""/>
+        <p:cNvGrpSpPr/>
+        <p:nvPr/>
+      </p:nvGrpSpPr>
+      <p:grpSpPr>
+        <a:xfrm>
+          <a:off x="0" y="0"/>
+          <a:ext cx="0" cy="0"/>
+          <a:chOff x="0" y="0"/>
+          <a:chExt cx="0" cy="0"/>
+        </a:xfrm>
+      </p:grpSpPr>
+      <p:sp>
+        <p:nvSpPr>
+          <p:cNvPr id="2" name="Title 1"/>
+          <p:cNvSpPr>
+            <a:spLocks noGrp="1"/>
+          </p:cNvSpPr>
+          <p:nvPr>
+            <p:ph type="title"/>
+          </p:nvPr>
+        </p:nvSpPr>
         <p:spPr>
           <a:xfrm>
             <a:off x="457201" y="204787"/>
@@ -4196,6 +4393,25 @@
                 <a:hlinkClick r:id="rId2"/>
               </a:rPr>
               <a:t>https://github.com/pds-data-dictionaries/ldd-spectral/tree/main/test</a:t>
+            </a:r>
+          </a:p>
+          <a:p>
+            <a:pPr lvl="0" indent="0" marL="0">
+              <a:spcBef>
+                <a:spcPts val="3000"/>
+              </a:spcBef>
+              <a:buNone/>
+            </a:pPr>
+            <a:r>
+              <a:rPr b="1"/>
+              <a:t>Objectives</a:t>
+            </a:r>
+          </a:p>
+          <a:p>
+            <a:pPr lvl="0"/>
+            <a:r>
+              <a:rPr/>
+              <a:t>Demonstrate monolithic tests</a:t>
             </a:r>
           </a:p>
         </p:txBody>
@@ -4265,209 +4481,6 @@
 </p:sld>
 </file>
 
-<file path=ppt/slides/slide2.xml><?xml version="1.0" encoding="utf-8"?>
-<p:sld xmlns:a="http://schemas.openxmlformats.org/drawingml/2006/main" xmlns:r="http://schemas.openxmlformats.org/officeDocument/2006/relationships" xmlns:p="http://schemas.openxmlformats.org/presentationml/2006/main">
-  <p:cSld>
-    <p:spTree>
-      <p:nvGrpSpPr>
-        <p:cNvPr id="1" name=""/>
-        <p:cNvGrpSpPr/>
-        <p:nvPr/>
-      </p:nvGrpSpPr>
-      <p:grpSpPr>
-        <a:xfrm>
-          <a:off x="0" y="0"/>
-          <a:ext cx="0" cy="0"/>
-          <a:chOff x="0" y="0"/>
-          <a:chExt cx="0" cy="0"/>
-        </a:xfrm>
-      </p:grpSpPr>
-      <p:sp>
-        <p:nvSpPr>
-          <p:cNvPr id="2" name="Title 1"/>
-          <p:cNvSpPr>
-            <a:spLocks noGrp="1"/>
-          </p:cNvSpPr>
-          <p:nvPr>
-            <p:ph type="title"/>
-          </p:nvPr>
-        </p:nvSpPr>
-        <p:spPr/>
-        <p:txBody>
-          <a:bodyPr/>
-          <a:lstStyle/>
-          <a:p>
-            <a:pPr lvl="0" indent="0" marL="0">
-              <a:buNone/>
-            </a:pPr>
-            <a:r>
-              <a:rPr/>
-              <a:t>Why Tests?</a:t>
-            </a:r>
-          </a:p>
-        </p:txBody>
-      </p:sp>
-      <p:sp>
-        <p:nvSpPr>
-          <p:cNvPr id="3" name="Content Placeholder 2"/>
-          <p:cNvSpPr>
-            <a:spLocks noGrp="1"/>
-          </p:cNvSpPr>
-          <p:nvPr>
-            <p:ph idx="1"/>
-          </p:nvPr>
-        </p:nvSpPr>
-        <p:spPr/>
-        <p:txBody>
-          <a:bodyPr/>
-          <a:lstStyle/>
-          <a:p>
-            <a:pPr lvl="0"/>
-            <a:r>
-              <a:rPr/>
-              <a:t>Passing tests provide examples of how the dictionary is used</a:t>
-            </a:r>
-          </a:p>
-          <a:p>
-            <a:pPr lvl="1"/>
-            <a:r>
-              <a:rPr/>
-              <a:t>This is not a substitute for documentation, but can supplement it</a:t>
-            </a:r>
-          </a:p>
-          <a:p>
-            <a:pPr lvl="0"/>
-            <a:r>
-              <a:rPr/>
-              <a:t>Ensure that every class definition works as intended</a:t>
-            </a:r>
-          </a:p>
-          <a:p>
-            <a:pPr lvl="0"/>
-            <a:r>
-              <a:rPr/>
-              <a:t>Ensures that schematron tests are running</a:t>
-            </a:r>
-          </a:p>
-          <a:p>
-            <a:pPr lvl="1"/>
-            <a:r>
-              <a:rPr/>
-              <a:t>Ensures that your schematron rules are correct</a:t>
-            </a:r>
-          </a:p>
-          <a:p>
-            <a:pPr lvl="0"/>
-            <a:r>
-              <a:rPr/>
-              <a:t>Prevent regressions</a:t>
-            </a:r>
-          </a:p>
-          <a:p>
-            <a:pPr lvl="1"/>
-            <a:r>
-              <a:rPr/>
-              <a:t>Regressions are unintended side-effects created by making changes</a:t>
-            </a:r>
-          </a:p>
-          <a:p>
-            <a:pPr lvl="0"/>
-            <a:r>
-              <a:rPr/>
-              <a:t>Warns if changes are not backwards-compatible</a:t>
-            </a:r>
-          </a:p>
-        </p:txBody>
-      </p:sp>
-    </p:spTree>
-  </p:cSld>
-</p:sld>
-</file>
-
-<file path=ppt/slides/slide20.xml><?xml version="1.0" encoding="utf-8"?>
-<p:sld xmlns:a="http://schemas.openxmlformats.org/drawingml/2006/main" xmlns:r="http://schemas.openxmlformats.org/officeDocument/2006/relationships" xmlns:p="http://schemas.openxmlformats.org/presentationml/2006/main">
-  <p:cSld>
-    <p:spTree>
-      <p:nvGrpSpPr>
-        <p:cNvPr id="1" name=""/>
-        <p:cNvGrpSpPr/>
-        <p:nvPr/>
-      </p:nvGrpSpPr>
-      <p:grpSpPr>
-        <a:xfrm>
-          <a:off x="0" y="0"/>
-          <a:ext cx="0" cy="0"/>
-          <a:chOff x="0" y="0"/>
-          <a:chExt cx="0" cy="0"/>
-        </a:xfrm>
-      </p:grpSpPr>
-      <p:sp>
-        <p:nvSpPr>
-          <p:cNvPr id="2" name="Title 1"/>
-          <p:cNvSpPr>
-            <a:spLocks noGrp="1"/>
-          </p:cNvSpPr>
-          <p:nvPr>
-            <p:ph type="title"/>
-          </p:nvPr>
-        </p:nvSpPr>
-        <p:spPr/>
-        <p:txBody>
-          <a:bodyPr/>
-          <a:lstStyle/>
-          <a:p>
-            <a:pPr lvl="0" indent="0" marL="0">
-              <a:buNone/>
-            </a:pPr>
-            <a:r>
-              <a:rPr/>
-              <a:t>Interpreting the test output for monolithic tests</a:t>
-            </a:r>
-          </a:p>
-        </p:txBody>
-      </p:sp>
-      <p:sp>
-        <p:nvSpPr>
-          <p:cNvPr id="3" name="Content Placeholder 2"/>
-          <p:cNvSpPr>
-            <a:spLocks noGrp="1"/>
-          </p:cNvSpPr>
-          <p:nvPr>
-            <p:ph idx="1"/>
-          </p:nvPr>
-        </p:nvSpPr>
-        <p:spPr/>
-        <p:txBody>
-          <a:bodyPr/>
-          <a:lstStyle/>
-          <a:p>
-            <a:pPr lvl="0"/>
-            <a:r>
-              <a:rPr/>
-              <a:t>Since monolithic tests have only a pass/fail result, and there are multiple expected failures, it’s possible to miss failures</a:t>
-            </a:r>
-          </a:p>
-          <a:p>
-            <a:pPr lvl="0"/>
-            <a:r>
-              <a:rPr/>
-              <a:t>This can be mitigated by expecting a certain number of failures, or checking for specific failure messages</a:t>
-            </a:r>
-          </a:p>
-          <a:p>
-            <a:pPr lvl="1"/>
-            <a:r>
-              <a:rPr/>
-              <a:t>This would require updates to the test runner</a:t>
-            </a:r>
-          </a:p>
-        </p:txBody>
-      </p:sp>
-    </p:spTree>
-  </p:cSld>
-</p:sld>
-</file>
-
 <file path=ppt/slides/slide21.xml><?xml version="1.0" encoding="utf-8"?>
 <p:sld xmlns:a="http://schemas.openxmlformats.org/drawingml/2006/main" xmlns:r="http://schemas.openxmlformats.org/officeDocument/2006/relationships" xmlns:p="http://schemas.openxmlformats.org/presentationml/2006/main">
   <p:cSld>
@@ -4505,7 +4518,7 @@
             </a:pPr>
             <a:r>
               <a:rPr/>
-              <a:t>How many tests?</a:t>
+              <a:t>Interpreting the test output for monolithic tests</a:t>
             </a:r>
           </a:p>
         </p:txBody>
@@ -4528,57 +4541,21 @@
             <a:pPr lvl="0"/>
             <a:r>
               <a:rPr/>
-              <a:t>You want to have enough to thoroughly test your dictionary.</a:t>
+              <a:t>Since monolithic tests have only a pass/fail result, and there are multiple expected failures, it’s possible to miss failures</a:t>
+            </a:r>
+          </a:p>
+          <a:p>
+            <a:pPr lvl="0"/>
+            <a:r>
+              <a:rPr/>
+              <a:t>This can be mitigated by expecting a certain number of failures, or checking for specific failure messages</a:t>
             </a:r>
           </a:p>
           <a:p>
             <a:pPr lvl="1"/>
             <a:r>
               <a:rPr/>
-              <a:t>Typically, this means that every class should be used at least once</a:t>
-            </a:r>
-          </a:p>
-          <a:p>
-            <a:pPr lvl="1"/>
-            <a:r>
-              <a:rPr/>
-              <a:t>Every schematron rule should pass and fail at least once, as well.</a:t>
-            </a:r>
-          </a:p>
-          <a:p>
-            <a:pPr lvl="0"/>
-            <a:r>
-              <a:rPr/>
-              <a:t>Too many tests can cause problems (This does </a:t>
-            </a:r>
-            <a:r>
-              <a:rPr i="1"/>
-              <a:t>not</a:t>
-            </a:r>
-            <a:r>
-              <a:rPr/>
-              <a:t> mean don’t write tests)</a:t>
-            </a:r>
-          </a:p>
-          <a:p>
-            <a:pPr lvl="1"/>
-            <a:r>
-              <a:rPr/>
-              <a:t>The biggest problem with too many tests is that they need to be maintained</a:t>
-            </a:r>
-          </a:p>
-          <a:p>
-            <a:pPr lvl="1"/>
-            <a:r>
-              <a:rPr/>
-              <a:t>Maintenance can be necessary when either your dictionary changes, or when the dependencies change (IM changes, upstream dictionaries, etc)</a:t>
-            </a:r>
-          </a:p>
-          <a:p>
-            <a:pPr lvl="1"/>
-            <a:r>
-              <a:rPr/>
-              <a:t>A test should have its own job – it shouldn’t just functionally duplicate another test</a:t>
+              <a:t>This would require updates to the test runner</a:t>
             </a:r>
           </a:p>
         </p:txBody>
@@ -4625,7 +4602,7 @@
             </a:pPr>
             <a:r>
               <a:rPr/>
-              <a:t>Exercise every class</a:t>
+              <a:t>How many tests?</a:t>
             </a:r>
           </a:p>
         </p:txBody>
@@ -4648,14 +4625,57 @@
             <a:pPr lvl="0"/>
             <a:r>
               <a:rPr/>
-              <a:t>At least one passing test should use each class</a:t>
-            </a:r>
-          </a:p>
-          <a:p>
-            <a:pPr lvl="0"/>
-            <a:r>
-              <a:rPr/>
-              <a:t>Write as many test files as necessary to achieve this.</a:t>
+              <a:t>You want to have enough to thoroughly test your dictionary.</a:t>
+            </a:r>
+          </a:p>
+          <a:p>
+            <a:pPr lvl="1"/>
+            <a:r>
+              <a:rPr/>
+              <a:t>Typically, this means that every class should be used at least once</a:t>
+            </a:r>
+          </a:p>
+          <a:p>
+            <a:pPr lvl="1"/>
+            <a:r>
+              <a:rPr/>
+              <a:t>Every schematron rule should pass and fail at least once, as well.</a:t>
+            </a:r>
+          </a:p>
+          <a:p>
+            <a:pPr lvl="0"/>
+            <a:r>
+              <a:rPr/>
+              <a:t>Too many tests can cause problems (This does </a:t>
+            </a:r>
+            <a:r>
+              <a:rPr i="1"/>
+              <a:t>not</a:t>
+            </a:r>
+            <a:r>
+              <a:rPr/>
+              <a:t> mean don’t write tests)</a:t>
+            </a:r>
+          </a:p>
+          <a:p>
+            <a:pPr lvl="1"/>
+            <a:r>
+              <a:rPr/>
+              <a:t>The biggest problem with too many tests is that they need to be maintained</a:t>
+            </a:r>
+          </a:p>
+          <a:p>
+            <a:pPr lvl="1"/>
+            <a:r>
+              <a:rPr/>
+              <a:t>Maintenance can be necessary when either your dictionary changes, or when the dependencies change (IM changes, upstream dictionaries, etc)</a:t>
+            </a:r>
+          </a:p>
+          <a:p>
+            <a:pPr lvl="1"/>
+            <a:r>
+              <a:rPr/>
+              <a:t>A test should have its own job – it shouldn’t just functionally duplicate another test</a:t>
             </a:r>
           </a:p>
         </p:txBody>
@@ -4702,7 +4722,7 @@
             </a:pPr>
             <a:r>
               <a:rPr/>
-              <a:t>Exercise every schematron rule</a:t>
+              <a:t>Exercise every class</a:t>
             </a:r>
           </a:p>
         </p:txBody>
@@ -4725,28 +4745,14 @@
             <a:pPr lvl="0"/>
             <a:r>
               <a:rPr/>
-              <a:t>At least one invalid label test should fail each schematron rule.</a:t>
-            </a:r>
-          </a:p>
-          <a:p>
-            <a:pPr lvl="0"/>
-            <a:r>
-              <a:rPr/>
-              <a:t>At least one valid label test should pass each schematron rule</a:t>
-            </a:r>
-          </a:p>
-          <a:p>
-            <a:pPr lvl="0"/>
-            <a:r>
-              <a:rPr/>
-              <a:t>At least one valid label test should not trigger the schematron rule, if possible.</a:t>
-            </a:r>
-          </a:p>
-          <a:p>
-            <a:pPr lvl="0"/>
-            <a:r>
-              <a:rPr/>
-              <a:t>This is especially important, since schematron rules can be prevented from triggering if incorrectly written.</a:t>
+              <a:t>At least one passing test should use each class</a:t>
+            </a:r>
+          </a:p>
+          <a:p>
+            <a:pPr lvl="0"/>
+            <a:r>
+              <a:rPr/>
+              <a:t>Write as many test files as necessary to achieve this.</a:t>
             </a:r>
           </a:p>
         </p:txBody>
@@ -4757,6 +4763,97 @@
 </file>
 
 <file path=ppt/slides/slide24.xml><?xml version="1.0" encoding="utf-8"?>
+<p:sld xmlns:a="http://schemas.openxmlformats.org/drawingml/2006/main" xmlns:r="http://schemas.openxmlformats.org/officeDocument/2006/relationships" xmlns:p="http://schemas.openxmlformats.org/presentationml/2006/main">
+  <p:cSld>
+    <p:spTree>
+      <p:nvGrpSpPr>
+        <p:cNvPr id="1" name=""/>
+        <p:cNvGrpSpPr/>
+        <p:nvPr/>
+      </p:nvGrpSpPr>
+      <p:grpSpPr>
+        <a:xfrm>
+          <a:off x="0" y="0"/>
+          <a:ext cx="0" cy="0"/>
+          <a:chOff x="0" y="0"/>
+          <a:chExt cx="0" cy="0"/>
+        </a:xfrm>
+      </p:grpSpPr>
+      <p:sp>
+        <p:nvSpPr>
+          <p:cNvPr id="2" name="Title 1"/>
+          <p:cNvSpPr>
+            <a:spLocks noGrp="1"/>
+          </p:cNvSpPr>
+          <p:nvPr>
+            <p:ph type="title"/>
+          </p:nvPr>
+        </p:nvSpPr>
+        <p:spPr/>
+        <p:txBody>
+          <a:bodyPr/>
+          <a:lstStyle/>
+          <a:p>
+            <a:pPr lvl="0" indent="0" marL="0">
+              <a:buNone/>
+            </a:pPr>
+            <a:r>
+              <a:rPr/>
+              <a:t>Exercise every schematron rule</a:t>
+            </a:r>
+          </a:p>
+        </p:txBody>
+      </p:sp>
+      <p:sp>
+        <p:nvSpPr>
+          <p:cNvPr id="3" name="Content Placeholder 2"/>
+          <p:cNvSpPr>
+            <a:spLocks noGrp="1"/>
+          </p:cNvSpPr>
+          <p:nvPr>
+            <p:ph idx="1"/>
+          </p:nvPr>
+        </p:nvSpPr>
+        <p:spPr/>
+        <p:txBody>
+          <a:bodyPr/>
+          <a:lstStyle/>
+          <a:p>
+            <a:pPr lvl="0"/>
+            <a:r>
+              <a:rPr/>
+              <a:t>At least one invalid label test should fail each schematron rule.</a:t>
+            </a:r>
+          </a:p>
+          <a:p>
+            <a:pPr lvl="0"/>
+            <a:r>
+              <a:rPr/>
+              <a:t>At least one valid label test should pass each schematron rule</a:t>
+            </a:r>
+          </a:p>
+          <a:p>
+            <a:pPr lvl="0"/>
+            <a:r>
+              <a:rPr/>
+              <a:t>At least one valid label test should not trigger the schematron rule, if possible.</a:t>
+            </a:r>
+          </a:p>
+          <a:p>
+            <a:pPr lvl="0"/>
+            <a:r>
+              <a:rPr/>
+              <a:t>This is especially important, since schematron rules can be prevented from triggering if incorrectly written.</a:t>
+            </a:r>
+          </a:p>
+        </p:txBody>
+      </p:sp>
+    </p:spTree>
+  </p:cSld>
+</p:sld>
+</file>
+
+<file path=ppt/slides/slide25.xml><?xml version="1.0" encoding="utf-8"?>
 <p:sld xmlns:a="http://schemas.openxmlformats.org/drawingml/2006/main" xmlns:r="http://schemas.openxmlformats.org/officeDocument/2006/relationships" xmlns:p="http://schemas.openxmlformats.org/presentationml/2006/main">
   <p:cSld>
     <p:spTree>
@@ -4895,97 +4992,6 @@
 </p:sld>
 </file>
 
-<file path=ppt/slides/slide25.xml><?xml version="1.0" encoding="utf-8"?>
-<p:sld xmlns:a="http://schemas.openxmlformats.org/drawingml/2006/main" xmlns:r="http://schemas.openxmlformats.org/officeDocument/2006/relationships" xmlns:p="http://schemas.openxmlformats.org/presentationml/2006/main">
-  <p:cSld>
-    <p:spTree>
-      <p:nvGrpSpPr>
-        <p:cNvPr id="1" name=""/>
-        <p:cNvGrpSpPr/>
-        <p:nvPr/>
-      </p:nvGrpSpPr>
-      <p:grpSpPr>
-        <a:xfrm>
-          <a:off x="0" y="0"/>
-          <a:ext cx="0" cy="0"/>
-          <a:chOff x="0" y="0"/>
-          <a:chExt cx="0" cy="0"/>
-        </a:xfrm>
-      </p:grpSpPr>
-      <p:sp>
-        <p:nvSpPr>
-          <p:cNvPr id="2" name="Title 1"/>
-          <p:cNvSpPr>
-            <a:spLocks noGrp="1"/>
-          </p:cNvSpPr>
-          <p:nvPr>
-            <p:ph type="title"/>
-          </p:nvPr>
-        </p:nvSpPr>
-        <p:spPr/>
-        <p:txBody>
-          <a:bodyPr/>
-          <a:lstStyle/>
-          <a:p>
-            <a:pPr lvl="0" indent="0" marL="0">
-              <a:buNone/>
-            </a:pPr>
-            <a:r>
-              <a:rPr/>
-              <a:t>Document the tests</a:t>
-            </a:r>
-          </a:p>
-        </p:txBody>
-      </p:sp>
-      <p:sp>
-        <p:nvSpPr>
-          <p:cNvPr id="3" name="Content Placeholder 2"/>
-          <p:cNvSpPr>
-            <a:spLocks noGrp="1"/>
-          </p:cNvSpPr>
-          <p:nvPr>
-            <p:ph idx="1"/>
-          </p:nvPr>
-        </p:nvSpPr>
-        <p:spPr/>
-        <p:txBody>
-          <a:bodyPr/>
-          <a:lstStyle/>
-          <a:p>
-            <a:pPr lvl="0"/>
-            <a:r>
-              <a:rPr/>
-              <a:t>Documentation can be as simple as a file that lists the test name and what it is testing.</a:t>
-            </a:r>
-          </a:p>
-          <a:p>
-            <a:pPr lvl="0"/>
-            <a:r>
-              <a:rPr/>
-              <a:t>This will remind you how each test is expected to fail, or what each test is intended to exercise.</a:t>
-            </a:r>
-          </a:p>
-          <a:p>
-            <a:pPr lvl="0"/>
-            <a:r>
-              <a:rPr/>
-              <a:t>If writing a monolithic test, this can be further developed into the expected output for comparison in a future version of the EN testing tool.</a:t>
-            </a:r>
-          </a:p>
-          <a:p>
-            <a:pPr lvl="0"/>
-            <a:r>
-              <a:rPr/>
-              <a:t>Documentation can also be written inline. It would be valuable to note precisely which line should fail.</a:t>
-            </a:r>
-          </a:p>
-        </p:txBody>
-      </p:sp>
-    </p:spTree>
-  </p:cSld>
-</p:sld>
-</file>
-
 <file path=ppt/slides/slide26.xml><?xml version="1.0" encoding="utf-8"?>
 <p:sld xmlns:a="http://schemas.openxmlformats.org/drawingml/2006/main" xmlns:r="http://schemas.openxmlformats.org/officeDocument/2006/relationships" xmlns:p="http://schemas.openxmlformats.org/presentationml/2006/main">
   <p:cSld>
@@ -5005,12 +5011,12 @@
       </p:grpSpPr>
       <p:sp>
         <p:nvSpPr>
-          <p:cNvPr id="2" name="Title 1"/>
-          <p:cNvSpPr>
-            <a:spLocks noGrp="1"/>
-          </p:cNvSpPr>
-          <p:nvPr>
-            <p:ph type="title"/>
+          <p:cNvPr id="3" name="Content Placeholder 2"/>
+          <p:cNvSpPr>
+            <a:spLocks noGrp="1"/>
+          </p:cNvSpPr>
+          <p:nvPr>
+            <p:ph idx="1"/>
           </p:nvPr>
         </p:nvSpPr>
         <p:spPr/>
@@ -5019,36 +5025,21 @@
           <a:lstStyle/>
           <a:p>
             <a:pPr lvl="0" indent="0" marL="0">
+              <a:spcBef>
+                <a:spcPts val="3000"/>
+              </a:spcBef>
               <a:buNone/>
             </a:pPr>
             <a:r>
-              <a:rPr/>
-              <a:t>Organize the tests</a:t>
-            </a:r>
-          </a:p>
-        </p:txBody>
-      </p:sp>
-      <p:sp>
-        <p:nvSpPr>
-          <p:cNvPr id="3" name="Content Placeholder 2"/>
-          <p:cNvSpPr>
-            <a:spLocks noGrp="1"/>
-          </p:cNvSpPr>
-          <p:nvPr>
-            <p:ph idx="1"/>
-          </p:nvPr>
-        </p:nvSpPr>
-        <p:spPr/>
-        <p:txBody>
-          <a:bodyPr/>
-          <a:lstStyle/>
-          <a:p>
-            <a:pPr lvl="0" indent="0" marL="0">
-              <a:buNone/>
-            </a:pPr>
-            <a:r>
-              <a:rPr/>
-              <a:t>At minimum, tests should be organized into valid and invalid label tests. Although this is embedded in the name, sorting them will make it easier to find the test that you need, especially as the number of tests grows.</a:t>
+              <a:rPr b="1"/>
+              <a:t>Objectives</a:t>
+            </a:r>
+          </a:p>
+          <a:p>
+            <a:pPr lvl="0"/>
+            <a:r>
+              <a:rPr/>
+              <a:t>Demonstrate tests for each schematron rule</a:t>
             </a:r>
           </a:p>
         </p:txBody>
@@ -5095,7 +5086,7 @@
             </a:pPr>
             <a:r>
               <a:rPr/>
-              <a:t>Static analysis tools</a:t>
+              <a:t>Document the tests</a:t>
             </a:r>
           </a:p>
         </p:txBody>
@@ -5118,49 +5109,28 @@
             <a:pPr lvl="0"/>
             <a:r>
               <a:rPr/>
-              <a:t>Validate tool</a:t>
-            </a:r>
-          </a:p>
-          <a:p>
-            <a:pPr lvl="1"/>
-            <a:r>
-              <a:rPr/>
-              <a:t>Ingest LDD files are part of the PDS4 information model, just like products. This means that the validator can run against them.</a:t>
-            </a:r>
-          </a:p>
-          <a:p>
-            <a:pPr lvl="0"/>
-            <a:r>
-              <a:rPr/>
-              <a:t>LDDTool</a:t>
-            </a:r>
-          </a:p>
-          <a:p>
-            <a:pPr lvl="1"/>
-            <a:r>
-              <a:rPr/>
-              <a:t>Catches many problems with a dictionary while it is being generated.</a:t>
-            </a:r>
-          </a:p>
-          <a:p>
-            <a:pPr lvl="0"/>
-            <a:r>
-              <a:rPr/>
-              <a:t>LDDPreflight</a:t>
-            </a:r>
-          </a:p>
-          <a:p>
-            <a:pPr lvl="1"/>
-            <a:r>
-              <a:rPr/>
-              <a:t>Runs several of the new rules proposed at this meeting, and raises any voilations.</a:t>
-            </a:r>
-          </a:p>
-          <a:p>
-            <a:pPr lvl="0"/>
-            <a:r>
-              <a:rPr/>
-              <a:t>These should be run before the regression tests, since errors at this point are easier to catch, and some of them will prevent the dictionary from being generated, or will prevent regression tests from passing.</a:t>
+              <a:t>Documentation can be as simple as a file that lists the test name and what it is testing.</a:t>
+            </a:r>
+          </a:p>
+          <a:p>
+            <a:pPr lvl="0"/>
+            <a:r>
+              <a:rPr/>
+              <a:t>This will remind you how each test is expected to fail, or what each test is intended to exercise.</a:t>
+            </a:r>
+          </a:p>
+          <a:p>
+            <a:pPr lvl="0"/>
+            <a:r>
+              <a:rPr/>
+              <a:t>If writing a monolithic test, this can be further developed into the expected output for comparison in a future version of the EN testing tool.</a:t>
+            </a:r>
+          </a:p>
+          <a:p>
+            <a:pPr lvl="0"/>
+            <a:r>
+              <a:rPr/>
+              <a:t>Documentation can also be written inline. It would be valuable to note precisely which line should fail.</a:t>
             </a:r>
           </a:p>
         </p:txBody>
@@ -5171,6 +5141,302 @@
 </file>
 
 <file path=ppt/slides/slide28.xml><?xml version="1.0" encoding="utf-8"?>
+<p:sld xmlns:a="http://schemas.openxmlformats.org/drawingml/2006/main" xmlns:r="http://schemas.openxmlformats.org/officeDocument/2006/relationships" xmlns:p="http://schemas.openxmlformats.org/presentationml/2006/main">
+  <p:cSld>
+    <p:spTree>
+      <p:nvGrpSpPr>
+        <p:cNvPr id="1" name=""/>
+        <p:cNvGrpSpPr/>
+        <p:nvPr/>
+      </p:nvGrpSpPr>
+      <p:grpSpPr>
+        <a:xfrm>
+          <a:off x="0" y="0"/>
+          <a:ext cx="0" cy="0"/>
+          <a:chOff x="0" y="0"/>
+          <a:chExt cx="0" cy="0"/>
+        </a:xfrm>
+      </p:grpSpPr>
+      <p:sp>
+        <p:nvSpPr>
+          <p:cNvPr id="2" name="Title 1"/>
+          <p:cNvSpPr>
+            <a:spLocks noGrp="1"/>
+          </p:cNvSpPr>
+          <p:nvPr>
+            <p:ph type="title"/>
+          </p:nvPr>
+        </p:nvSpPr>
+        <p:spPr/>
+        <p:txBody>
+          <a:bodyPr/>
+          <a:lstStyle/>
+          <a:p>
+            <a:pPr lvl="0" indent="0" marL="0">
+              <a:buNone/>
+            </a:pPr>
+            <a:r>
+              <a:rPr/>
+              <a:t>Organize the tests</a:t>
+            </a:r>
+          </a:p>
+        </p:txBody>
+      </p:sp>
+      <p:sp>
+        <p:nvSpPr>
+          <p:cNvPr id="3" name="Content Placeholder 2"/>
+          <p:cNvSpPr>
+            <a:spLocks noGrp="1"/>
+          </p:cNvSpPr>
+          <p:nvPr>
+            <p:ph idx="1"/>
+          </p:nvPr>
+        </p:nvSpPr>
+        <p:spPr/>
+        <p:txBody>
+          <a:bodyPr/>
+          <a:lstStyle/>
+          <a:p>
+            <a:pPr lvl="0" indent="0" marL="0">
+              <a:buNone/>
+            </a:pPr>
+            <a:r>
+              <a:rPr/>
+              <a:t>At minimum, tests should be organized into valid and invalid label tests. Although this is embedded in the name, sorting them will make it easier to find the test that you need, especially as the number of tests grows.</a:t>
+            </a:r>
+          </a:p>
+        </p:txBody>
+      </p:sp>
+    </p:spTree>
+  </p:cSld>
+</p:sld>
+</file>
+
+<file path=ppt/slides/slide29.xml><?xml version="1.0" encoding="utf-8"?>
+<p:sld xmlns:a="http://schemas.openxmlformats.org/drawingml/2006/main" xmlns:r="http://schemas.openxmlformats.org/officeDocument/2006/relationships" xmlns:p="http://schemas.openxmlformats.org/presentationml/2006/main">
+  <p:cSld>
+    <p:spTree>
+      <p:nvGrpSpPr>
+        <p:cNvPr id="1" name=""/>
+        <p:cNvGrpSpPr/>
+        <p:nvPr/>
+      </p:nvGrpSpPr>
+      <p:grpSpPr>
+        <a:xfrm>
+          <a:off x="0" y="0"/>
+          <a:ext cx="0" cy="0"/>
+          <a:chOff x="0" y="0"/>
+          <a:chExt cx="0" cy="0"/>
+        </a:xfrm>
+      </p:grpSpPr>
+      <p:sp>
+        <p:nvSpPr>
+          <p:cNvPr id="2" name="Title 1"/>
+          <p:cNvSpPr>
+            <a:spLocks noGrp="1"/>
+          </p:cNvSpPr>
+          <p:nvPr>
+            <p:ph type="title"/>
+          </p:nvPr>
+        </p:nvSpPr>
+        <p:spPr/>
+        <p:txBody>
+          <a:bodyPr/>
+          <a:lstStyle/>
+          <a:p>
+            <a:pPr lvl="0" indent="0" marL="0">
+              <a:buNone/>
+            </a:pPr>
+            <a:r>
+              <a:rPr/>
+              <a:t>Static analysis tools</a:t>
+            </a:r>
+          </a:p>
+        </p:txBody>
+      </p:sp>
+      <p:sp>
+        <p:nvSpPr>
+          <p:cNvPr id="3" name="Content Placeholder 2"/>
+          <p:cNvSpPr>
+            <a:spLocks noGrp="1"/>
+          </p:cNvSpPr>
+          <p:nvPr>
+            <p:ph idx="1"/>
+          </p:nvPr>
+        </p:nvSpPr>
+        <p:spPr/>
+        <p:txBody>
+          <a:bodyPr/>
+          <a:lstStyle/>
+          <a:p>
+            <a:pPr lvl="0"/>
+            <a:r>
+              <a:rPr/>
+              <a:t>Validate tool</a:t>
+            </a:r>
+          </a:p>
+          <a:p>
+            <a:pPr lvl="1"/>
+            <a:r>
+              <a:rPr/>
+              <a:t>Ingest LDD files are part of the PDS4 information model, just like products. This means that the validator can run against them.</a:t>
+            </a:r>
+          </a:p>
+          <a:p>
+            <a:pPr lvl="0"/>
+            <a:r>
+              <a:rPr/>
+              <a:t>LDDTool</a:t>
+            </a:r>
+          </a:p>
+          <a:p>
+            <a:pPr lvl="1"/>
+            <a:r>
+              <a:rPr/>
+              <a:t>Catches many problems with a dictionary while it is being generated.</a:t>
+            </a:r>
+          </a:p>
+          <a:p>
+            <a:pPr lvl="0"/>
+            <a:r>
+              <a:rPr/>
+              <a:t>LDDPreflight</a:t>
+            </a:r>
+          </a:p>
+          <a:p>
+            <a:pPr lvl="1"/>
+            <a:r>
+              <a:rPr/>
+              <a:t>Runs several of the new rules proposed at this meeting, and raises any voilations.</a:t>
+            </a:r>
+          </a:p>
+          <a:p>
+            <a:pPr lvl="0"/>
+            <a:r>
+              <a:rPr/>
+              <a:t>These should be run before the regression tests, since errors at this point are easier to catch, and some of them will prevent the dictionary from being generated, or will prevent regression tests from passing.</a:t>
+            </a:r>
+          </a:p>
+        </p:txBody>
+      </p:sp>
+    </p:spTree>
+  </p:cSld>
+</p:sld>
+</file>
+
+<file path=ppt/slides/slide3.xml><?xml version="1.0" encoding="utf-8"?>
+<p:sld xmlns:a="http://schemas.openxmlformats.org/drawingml/2006/main" xmlns:r="http://schemas.openxmlformats.org/officeDocument/2006/relationships" xmlns:p="http://schemas.openxmlformats.org/presentationml/2006/main">
+  <p:cSld>
+    <p:spTree>
+      <p:nvGrpSpPr>
+        <p:cNvPr id="1" name=""/>
+        <p:cNvGrpSpPr/>
+        <p:nvPr/>
+      </p:nvGrpSpPr>
+      <p:grpSpPr>
+        <a:xfrm>
+          <a:off x="0" y="0"/>
+          <a:ext cx="0" cy="0"/>
+          <a:chOff x="0" y="0"/>
+          <a:chExt cx="0" cy="0"/>
+        </a:xfrm>
+      </p:grpSpPr>
+      <p:sp>
+        <p:nvSpPr>
+          <p:cNvPr id="2" name="Title 1"/>
+          <p:cNvSpPr>
+            <a:spLocks noGrp="1"/>
+          </p:cNvSpPr>
+          <p:nvPr>
+            <p:ph type="title"/>
+          </p:nvPr>
+        </p:nvSpPr>
+        <p:spPr/>
+        <p:txBody>
+          <a:bodyPr/>
+          <a:lstStyle/>
+          <a:p>
+            <a:pPr lvl="0" indent="0" marL="0">
+              <a:buNone/>
+            </a:pPr>
+            <a:r>
+              <a:rPr/>
+              <a:t>Testing methodologies</a:t>
+            </a:r>
+          </a:p>
+        </p:txBody>
+      </p:sp>
+      <p:sp>
+        <p:nvSpPr>
+          <p:cNvPr id="3" name="Content Placeholder 2"/>
+          <p:cNvSpPr>
+            <a:spLocks noGrp="1"/>
+          </p:cNvSpPr>
+          <p:nvPr>
+            <p:ph idx="1"/>
+          </p:nvPr>
+        </p:nvSpPr>
+        <p:spPr/>
+        <p:txBody>
+          <a:bodyPr/>
+          <a:lstStyle/>
+          <a:p>
+            <a:pPr lvl="0"/>
+            <a:r>
+              <a:rPr/>
+              <a:t>Regression testing</a:t>
+            </a:r>
+          </a:p>
+          <a:p>
+            <a:pPr lvl="1"/>
+            <a:r>
+              <a:rPr/>
+              <a:t>This method generates the dictionary, and validates special labels against the dictionary.</a:t>
+            </a:r>
+          </a:p>
+          <a:p>
+            <a:pPr lvl="2"/>
+            <a:r>
+              <a:rPr/>
+              <a:t>Thse labels are specifically designed to pass or fail validation</a:t>
+            </a:r>
+          </a:p>
+          <a:p>
+            <a:pPr lvl="2"/>
+            <a:r>
+              <a:rPr/>
+              <a:t>If the validation result does not match the intent of the label, then there is a problem with the dictionary.</a:t>
+            </a:r>
+          </a:p>
+          <a:p>
+            <a:pPr lvl="0"/>
+            <a:r>
+              <a:rPr/>
+              <a:t>Static analysis</a:t>
+            </a:r>
+          </a:p>
+          <a:p>
+            <a:pPr lvl="1"/>
+            <a:r>
+              <a:rPr/>
+              <a:t>This evaluates the dictionary according to predefined rules, without necessarily comparing it against labels.</a:t>
+            </a:r>
+          </a:p>
+          <a:p>
+            <a:pPr lvl="0"/>
+            <a:r>
+              <a:rPr/>
+              <a:t>Regression testing and static analysis are complementary tools, and both are needed to fully evaluate a dictionary.</a:t>
+            </a:r>
+          </a:p>
+        </p:txBody>
+      </p:sp>
+    </p:spTree>
+  </p:cSld>
+</p:sld>
+</file>
+
+<file path=ppt/slides/slide30.xml><?xml version="1.0" encoding="utf-8"?>
 <p:sld xmlns:a="http://schemas.openxmlformats.org/drawingml/2006/main" xmlns:r="http://schemas.openxmlformats.org/officeDocument/2006/relationships" xmlns:p="http://schemas.openxmlformats.org/presentationml/2006/main">
   <p:cSld>
     <p:spTree>
@@ -5309,7 +5575,7 @@
 </p:sld>
 </file>
 
-<file path=ppt/slides/slide29.xml><?xml version="1.0" encoding="utf-8"?>
+<file path=ppt/slides/slide31.xml><?xml version="1.0" encoding="utf-8"?>
 <p:sld xmlns:a="http://schemas.openxmlformats.org/drawingml/2006/main" xmlns:r="http://schemas.openxmlformats.org/officeDocument/2006/relationships" xmlns:p="http://schemas.openxmlformats.org/presentationml/2006/main">
   <p:cSld>
     <p:spTree>
@@ -5460,119 +5726,7 @@
 </p:sld>
 </file>
 
-<file path=ppt/slides/slide3.xml><?xml version="1.0" encoding="utf-8"?>
-<p:sld xmlns:a="http://schemas.openxmlformats.org/drawingml/2006/main" xmlns:r="http://schemas.openxmlformats.org/officeDocument/2006/relationships" xmlns:p="http://schemas.openxmlformats.org/presentationml/2006/main">
-  <p:cSld>
-    <p:spTree>
-      <p:nvGrpSpPr>
-        <p:cNvPr id="1" name=""/>
-        <p:cNvGrpSpPr/>
-        <p:nvPr/>
-      </p:nvGrpSpPr>
-      <p:grpSpPr>
-        <a:xfrm>
-          <a:off x="0" y="0"/>
-          <a:ext cx="0" cy="0"/>
-          <a:chOff x="0" y="0"/>
-          <a:chExt cx="0" cy="0"/>
-        </a:xfrm>
-      </p:grpSpPr>
-      <p:sp>
-        <p:nvSpPr>
-          <p:cNvPr id="2" name="Title 1"/>
-          <p:cNvSpPr>
-            <a:spLocks noGrp="1"/>
-          </p:cNvSpPr>
-          <p:nvPr>
-            <p:ph type="title"/>
-          </p:nvPr>
-        </p:nvSpPr>
-        <p:spPr/>
-        <p:txBody>
-          <a:bodyPr/>
-          <a:lstStyle/>
-          <a:p>
-            <a:pPr lvl="0" indent="0" marL="0">
-              <a:buNone/>
-            </a:pPr>
-            <a:r>
-              <a:rPr/>
-              <a:t>Testing methodologies</a:t>
-            </a:r>
-          </a:p>
-        </p:txBody>
-      </p:sp>
-      <p:sp>
-        <p:nvSpPr>
-          <p:cNvPr id="3" name="Content Placeholder 2"/>
-          <p:cNvSpPr>
-            <a:spLocks noGrp="1"/>
-          </p:cNvSpPr>
-          <p:nvPr>
-            <p:ph idx="1"/>
-          </p:nvPr>
-        </p:nvSpPr>
-        <p:spPr/>
-        <p:txBody>
-          <a:bodyPr/>
-          <a:lstStyle/>
-          <a:p>
-            <a:pPr lvl="0"/>
-            <a:r>
-              <a:rPr/>
-              <a:t>Regression testing</a:t>
-            </a:r>
-          </a:p>
-          <a:p>
-            <a:pPr lvl="1"/>
-            <a:r>
-              <a:rPr/>
-              <a:t>This method generates the dictionary, and validates special labels against the dictionary.</a:t>
-            </a:r>
-          </a:p>
-          <a:p>
-            <a:pPr lvl="2"/>
-            <a:r>
-              <a:rPr/>
-              <a:t>Thse labels are specifically designed to pass or fail validation</a:t>
-            </a:r>
-          </a:p>
-          <a:p>
-            <a:pPr lvl="2"/>
-            <a:r>
-              <a:rPr/>
-              <a:t>If the validation result does not match the intent of the label, then there is a problem with the dictionary.</a:t>
-            </a:r>
-          </a:p>
-          <a:p>
-            <a:pPr lvl="0"/>
-            <a:r>
-              <a:rPr/>
-              <a:t>Static analysis</a:t>
-            </a:r>
-          </a:p>
-          <a:p>
-            <a:pPr lvl="1"/>
-            <a:r>
-              <a:rPr/>
-              <a:t>This evaluates the dictionary according to predefined rules, without necessarily comparing it against labels.</a:t>
-            </a:r>
-          </a:p>
-          <a:p>
-            <a:pPr lvl="0"/>
-            <a:r>
-              <a:rPr/>
-              <a:t>Regression testing and static analysis are complementary tools, and both are needed to fully evaluate a dictionary.</a:t>
-            </a:r>
-          </a:p>
-        </p:txBody>
-      </p:sp>
-    </p:spTree>
-  </p:cSld>
-</p:sld>
-</file>
-
-<file path=ppt/slides/slide30.xml><?xml version="1.0" encoding="utf-8"?>
+<file path=ppt/slides/slide32.xml><?xml version="1.0" encoding="utf-8"?>
 <p:sld xmlns:a="http://schemas.openxmlformats.org/drawingml/2006/main" xmlns:r="http://schemas.openxmlformats.org/officeDocument/2006/relationships" xmlns:p="http://schemas.openxmlformats.org/presentationml/2006/main">
   <p:cSld>
     <p:spTree>

</xml_diff>

<commit_message>
Added objectives for the tools
</commit_message>
<xml_diff>
--- a/LDDTesting/stone-LDDTestingPrinciples.pptx
+++ b/LDDTesting/stone-LDDTestingPrinciples.pptx
@@ -35,8 +35,6 @@
     <p:sldId id="283" r:id="rId29"/>
     <p:sldId id="284" r:id="rId30"/>
     <p:sldId id="285" r:id="rId31"/>
-    <p:sldId id="286" r:id="rId32"/>
-    <p:sldId id="287" r:id="rId33"/>
   </p:sldIdLst>
   <p:sldSz cx="9144000" cy="5143500" type="screen16x9"/>
   <p:notesSz cx="6858000" cy="9144000"/>
@@ -3751,6 +3749,25 @@
               <a:t>https://github.com/pds-data-dictionaries/ldd-survey/tree/main/test</a:t>
             </a:r>
           </a:p>
+          <a:p>
+            <a:pPr lvl="0" indent="0" marL="0">
+              <a:spcBef>
+                <a:spcPts val="3000"/>
+              </a:spcBef>
+              <a:buNone/>
+            </a:pPr>
+            <a:r>
+              <a:rPr b="1"/>
+              <a:t>Objectives</a:t>
+            </a:r>
+          </a:p>
+          <a:p>
+            <a:pPr lvl="0"/>
+            <a:r>
+              <a:rPr/>
+              <a:t>Demonstrate granular tests</a:t>
+            </a:r>
+          </a:p>
         </p:txBody>
       </p:sp>
       <p:pic>
@@ -3837,6 +3854,31 @@
       </p:grpSpPr>
       <p:sp>
         <p:nvSpPr>
+          <p:cNvPr id="2" name="Title 1"/>
+          <p:cNvSpPr>
+            <a:spLocks noGrp="1"/>
+          </p:cNvSpPr>
+          <p:nvPr>
+            <p:ph type="title"/>
+          </p:nvPr>
+        </p:nvSpPr>
+        <p:spPr/>
+        <p:txBody>
+          <a:bodyPr/>
+          <a:lstStyle/>
+          <a:p>
+            <a:pPr lvl="0" indent="0" marL="0">
+              <a:buNone/>
+            </a:pPr>
+            <a:r>
+              <a:rPr/>
+              <a:t>Generating Test Labels</a:t>
+            </a:r>
+          </a:p>
+        </p:txBody>
+      </p:sp>
+      <p:sp>
+        <p:nvSpPr>
           <p:cNvPr id="3" name="Content Placeholder 2"/>
           <p:cNvSpPr>
             <a:spLocks noGrp="1"/>
@@ -3850,22 +3892,46 @@
           <a:bodyPr/>
           <a:lstStyle/>
           <a:p>
-            <a:pPr lvl="0" indent="0" marL="0">
-              <a:spcBef>
-                <a:spcPts val="3000"/>
-              </a:spcBef>
-              <a:buNone/>
-            </a:pPr>
-            <a:r>
-              <a:rPr b="1"/>
-              <a:t>Objectives</a:t>
-            </a:r>
-          </a:p>
-          <a:p>
-            <a:pPr lvl="0"/>
-            <a:r>
-              <a:rPr/>
-              <a:t>Demonstrate granular tests</a:t>
+            <a:pPr lvl="0"/>
+            <a:r>
+              <a:rPr/>
+              <a:t>Hand writing labels</a:t>
+            </a:r>
+          </a:p>
+          <a:p>
+            <a:pPr lvl="0"/>
+            <a:r>
+              <a:rPr/>
+              <a:t>Injecting discipline area fragments into label templates</a:t>
+            </a:r>
+          </a:p>
+          <a:p>
+            <a:pPr lvl="1"/>
+            <a:r>
+              <a:rPr/>
+              <a:t>In addition to making the labels easier to generate, the parts of the label that are being tested are separated from the rest of the label.</a:t>
+            </a:r>
+          </a:p>
+          <a:p>
+            <a:pPr lvl="0"/>
+            <a:r>
+              <a:rPr/>
+              <a:t>Mutating existing labels</a:t>
+            </a:r>
+          </a:p>
+          <a:p>
+            <a:pPr lvl="1"/>
+            <a:r>
+              <a:rPr/>
+              <a:t>Keep a mapping of </a:t>
+            </a:r>
+            <a:r>
+              <a:rPr i="1"/>
+              <a:t>XPath</a:t>
+            </a:r>
+            <a:r>
+              <a:rPr/>
+              <a:t>s and operations to perform on a location</a:t>
             </a:r>
           </a:p>
         </p:txBody>
@@ -3902,112 +3968,6 @@
             <p:ph type="title"/>
           </p:nvPr>
         </p:nvSpPr>
-        <p:spPr/>
-        <p:txBody>
-          <a:bodyPr/>
-          <a:lstStyle/>
-          <a:p>
-            <a:pPr lvl="0" indent="0" marL="0">
-              <a:buNone/>
-            </a:pPr>
-            <a:r>
-              <a:rPr/>
-              <a:t>Generating Test Labels</a:t>
-            </a:r>
-          </a:p>
-        </p:txBody>
-      </p:sp>
-      <p:sp>
-        <p:nvSpPr>
-          <p:cNvPr id="3" name="Content Placeholder 2"/>
-          <p:cNvSpPr>
-            <a:spLocks noGrp="1"/>
-          </p:cNvSpPr>
-          <p:nvPr>
-            <p:ph idx="1"/>
-          </p:nvPr>
-        </p:nvSpPr>
-        <p:spPr/>
-        <p:txBody>
-          <a:bodyPr/>
-          <a:lstStyle/>
-          <a:p>
-            <a:pPr lvl="0"/>
-            <a:r>
-              <a:rPr/>
-              <a:t>Hand writing labels</a:t>
-            </a:r>
-          </a:p>
-          <a:p>
-            <a:pPr lvl="0"/>
-            <a:r>
-              <a:rPr/>
-              <a:t>Injecting discipline area fragments into label templates</a:t>
-            </a:r>
-          </a:p>
-          <a:p>
-            <a:pPr lvl="1"/>
-            <a:r>
-              <a:rPr/>
-              <a:t>In addition to making the labels easier to generate, the parts of the label that are being tested are separated from the rest of the label.</a:t>
-            </a:r>
-          </a:p>
-          <a:p>
-            <a:pPr lvl="0"/>
-            <a:r>
-              <a:rPr/>
-              <a:t>Mutating existing labels</a:t>
-            </a:r>
-          </a:p>
-          <a:p>
-            <a:pPr lvl="1"/>
-            <a:r>
-              <a:rPr/>
-              <a:t>Keep a mapping of </a:t>
-            </a:r>
-            <a:r>
-              <a:rPr i="1"/>
-              <a:t>XPath</a:t>
-            </a:r>
-            <a:r>
-              <a:rPr/>
-              <a:t>s and operations to perform on a location</a:t>
-            </a:r>
-          </a:p>
-        </p:txBody>
-      </p:sp>
-    </p:spTree>
-  </p:cSld>
-</p:sld>
-</file>
-
-<file path=ppt/slides/slide18.xml><?xml version="1.0" encoding="utf-8"?>
-<p:sld xmlns:a="http://schemas.openxmlformats.org/drawingml/2006/main" xmlns:r="http://schemas.openxmlformats.org/officeDocument/2006/relationships" xmlns:p="http://schemas.openxmlformats.org/presentationml/2006/main">
-  <p:cSld>
-    <p:spTree>
-      <p:nvGrpSpPr>
-        <p:cNvPr id="1" name=""/>
-        <p:cNvGrpSpPr/>
-        <p:nvPr/>
-      </p:nvGrpSpPr>
-      <p:grpSpPr>
-        <a:xfrm>
-          <a:off x="0" y="0"/>
-          <a:ext cx="0" cy="0"/>
-          <a:chOff x="0" y="0"/>
-          <a:chExt cx="0" cy="0"/>
-        </a:xfrm>
-      </p:grpSpPr>
-      <p:sp>
-        <p:nvSpPr>
-          <p:cNvPr id="2" name="Title 1"/>
-          <p:cNvSpPr>
-            <a:spLocks noGrp="1"/>
-          </p:cNvSpPr>
-          <p:nvPr>
-            <p:ph type="title"/>
-          </p:nvPr>
-        </p:nvSpPr>
         <p:spPr>
           <a:xfrm>
             <a:off x="457201" y="204787"/>
@@ -4051,6 +4011,32 @@
                 <a:hlinkClick r:id="rId2"/>
               </a:rPr>
               <a:t>https://github.com/sbn-psi/ldd_utilities/tree/master/LddTestGenerator</a:t>
+            </a:r>
+          </a:p>
+          <a:p>
+            <a:pPr lvl="0" indent="0" marL="0">
+              <a:spcBef>
+                <a:spcPts val="3000"/>
+              </a:spcBef>
+              <a:buNone/>
+            </a:pPr>
+            <a:r>
+              <a:rPr b="1"/>
+              <a:t>Objectives</a:t>
+            </a:r>
+          </a:p>
+          <a:p>
+            <a:pPr lvl="0"/>
+            <a:r>
+              <a:rPr/>
+              <a:t>Demonstrate a template-based approach to generating test labels</a:t>
+            </a:r>
+          </a:p>
+          <a:p>
+            <a:pPr lvl="0"/>
+            <a:r>
+              <a:rPr/>
+              <a:t>Mention how the framework could be expanded to mutate test files</a:t>
             </a:r>
           </a:p>
         </p:txBody>
@@ -4120,7 +4106,7 @@
 </p:sld>
 </file>
 
-<file path=ppt/slides/slide19.xml><?xml version="1.0" encoding="utf-8"?>
+<file path=ppt/slides/slide18.xml><?xml version="1.0" encoding="utf-8"?>
 <p:sld xmlns:a="http://schemas.openxmlformats.org/drawingml/2006/main" xmlns:r="http://schemas.openxmlformats.org/officeDocument/2006/relationships" xmlns:p="http://schemas.openxmlformats.org/presentationml/2006/main">
   <p:cSld>
     <p:spTree>
@@ -4204,126 +4190,7 @@
 </p:sld>
 </file>
 
-<file path=ppt/slides/slide2.xml><?xml version="1.0" encoding="utf-8"?>
-<p:sld xmlns:a="http://schemas.openxmlformats.org/drawingml/2006/main" xmlns:r="http://schemas.openxmlformats.org/officeDocument/2006/relationships" xmlns:p="http://schemas.openxmlformats.org/presentationml/2006/main">
-  <p:cSld>
-    <p:spTree>
-      <p:nvGrpSpPr>
-        <p:cNvPr id="1" name=""/>
-        <p:cNvGrpSpPr/>
-        <p:nvPr/>
-      </p:nvGrpSpPr>
-      <p:grpSpPr>
-        <a:xfrm>
-          <a:off x="0" y="0"/>
-          <a:ext cx="0" cy="0"/>
-          <a:chOff x="0" y="0"/>
-          <a:chExt cx="0" cy="0"/>
-        </a:xfrm>
-      </p:grpSpPr>
-      <p:sp>
-        <p:nvSpPr>
-          <p:cNvPr id="2" name="Title 1"/>
-          <p:cNvSpPr>
-            <a:spLocks noGrp="1"/>
-          </p:cNvSpPr>
-          <p:nvPr>
-            <p:ph type="title"/>
-          </p:nvPr>
-        </p:nvSpPr>
-        <p:spPr/>
-        <p:txBody>
-          <a:bodyPr/>
-          <a:lstStyle/>
-          <a:p>
-            <a:pPr lvl="0" indent="0" marL="0">
-              <a:buNone/>
-            </a:pPr>
-            <a:r>
-              <a:rPr/>
-              <a:t>Why Tests?</a:t>
-            </a:r>
-          </a:p>
-        </p:txBody>
-      </p:sp>
-      <p:sp>
-        <p:nvSpPr>
-          <p:cNvPr id="3" name="Content Placeholder 2"/>
-          <p:cNvSpPr>
-            <a:spLocks noGrp="1"/>
-          </p:cNvSpPr>
-          <p:nvPr>
-            <p:ph idx="1"/>
-          </p:nvPr>
-        </p:nvSpPr>
-        <p:spPr/>
-        <p:txBody>
-          <a:bodyPr/>
-          <a:lstStyle/>
-          <a:p>
-            <a:pPr lvl="0"/>
-            <a:r>
-              <a:rPr/>
-              <a:t>Passing tests provide examples of how the dictionary is used</a:t>
-            </a:r>
-          </a:p>
-          <a:p>
-            <a:pPr lvl="1"/>
-            <a:r>
-              <a:rPr/>
-              <a:t>This is not a substitute for documentation, but can supplement it</a:t>
-            </a:r>
-          </a:p>
-          <a:p>
-            <a:pPr lvl="0"/>
-            <a:r>
-              <a:rPr/>
-              <a:t>Ensure that every class definition works as intended</a:t>
-            </a:r>
-          </a:p>
-          <a:p>
-            <a:pPr lvl="0"/>
-            <a:r>
-              <a:rPr/>
-              <a:t>Ensures that schematron tests are running</a:t>
-            </a:r>
-          </a:p>
-          <a:p>
-            <a:pPr lvl="1"/>
-            <a:r>
-              <a:rPr/>
-              <a:t>Ensures that your schematron rules are correct</a:t>
-            </a:r>
-          </a:p>
-          <a:p>
-            <a:pPr lvl="0"/>
-            <a:r>
-              <a:rPr/>
-              <a:t>Prevent regressions</a:t>
-            </a:r>
-          </a:p>
-          <a:p>
-            <a:pPr lvl="1"/>
-            <a:r>
-              <a:rPr/>
-              <a:t>Regressions are unintended side-effects created by making changes</a:t>
-            </a:r>
-          </a:p>
-          <a:p>
-            <a:pPr lvl="0"/>
-            <a:r>
-              <a:rPr/>
-              <a:t>Warns if changes are not backwards-compatible</a:t>
-            </a:r>
-          </a:p>
-        </p:txBody>
-      </p:sp>
-    </p:spTree>
-  </p:cSld>
-</p:sld>
-</file>
-
-<file path=ppt/slides/slide20.xml><?xml version="1.0" encoding="utf-8"?>
+<file path=ppt/slides/slide19.xml><?xml version="1.0" encoding="utf-8"?>
 <p:sld xmlns:a="http://schemas.openxmlformats.org/drawingml/2006/main" xmlns:r="http://schemas.openxmlformats.org/officeDocument/2006/relationships" xmlns:p="http://schemas.openxmlformats.org/presentationml/2006/main">
   <p:cSld>
     <p:spTree>
@@ -4481,6 +4348,209 @@
 </p:sld>
 </file>
 
+<file path=ppt/slides/slide2.xml><?xml version="1.0" encoding="utf-8"?>
+<p:sld xmlns:a="http://schemas.openxmlformats.org/drawingml/2006/main" xmlns:r="http://schemas.openxmlformats.org/officeDocument/2006/relationships" xmlns:p="http://schemas.openxmlformats.org/presentationml/2006/main">
+  <p:cSld>
+    <p:spTree>
+      <p:nvGrpSpPr>
+        <p:cNvPr id="1" name=""/>
+        <p:cNvGrpSpPr/>
+        <p:nvPr/>
+      </p:nvGrpSpPr>
+      <p:grpSpPr>
+        <a:xfrm>
+          <a:off x="0" y="0"/>
+          <a:ext cx="0" cy="0"/>
+          <a:chOff x="0" y="0"/>
+          <a:chExt cx="0" cy="0"/>
+        </a:xfrm>
+      </p:grpSpPr>
+      <p:sp>
+        <p:nvSpPr>
+          <p:cNvPr id="2" name="Title 1"/>
+          <p:cNvSpPr>
+            <a:spLocks noGrp="1"/>
+          </p:cNvSpPr>
+          <p:nvPr>
+            <p:ph type="title"/>
+          </p:nvPr>
+        </p:nvSpPr>
+        <p:spPr/>
+        <p:txBody>
+          <a:bodyPr/>
+          <a:lstStyle/>
+          <a:p>
+            <a:pPr lvl="0" indent="0" marL="0">
+              <a:buNone/>
+            </a:pPr>
+            <a:r>
+              <a:rPr/>
+              <a:t>Why Tests?</a:t>
+            </a:r>
+          </a:p>
+        </p:txBody>
+      </p:sp>
+      <p:sp>
+        <p:nvSpPr>
+          <p:cNvPr id="3" name="Content Placeholder 2"/>
+          <p:cNvSpPr>
+            <a:spLocks noGrp="1"/>
+          </p:cNvSpPr>
+          <p:nvPr>
+            <p:ph idx="1"/>
+          </p:nvPr>
+        </p:nvSpPr>
+        <p:spPr/>
+        <p:txBody>
+          <a:bodyPr/>
+          <a:lstStyle/>
+          <a:p>
+            <a:pPr lvl="0"/>
+            <a:r>
+              <a:rPr/>
+              <a:t>Passing tests provide examples of how the dictionary is used</a:t>
+            </a:r>
+          </a:p>
+          <a:p>
+            <a:pPr lvl="1"/>
+            <a:r>
+              <a:rPr/>
+              <a:t>This is not a substitute for documentation, but can supplement it</a:t>
+            </a:r>
+          </a:p>
+          <a:p>
+            <a:pPr lvl="0"/>
+            <a:r>
+              <a:rPr/>
+              <a:t>Ensure that every class definition works as intended</a:t>
+            </a:r>
+          </a:p>
+          <a:p>
+            <a:pPr lvl="0"/>
+            <a:r>
+              <a:rPr/>
+              <a:t>Ensures that schematron tests are running</a:t>
+            </a:r>
+          </a:p>
+          <a:p>
+            <a:pPr lvl="1"/>
+            <a:r>
+              <a:rPr/>
+              <a:t>Ensures that your schematron rules are correct</a:t>
+            </a:r>
+          </a:p>
+          <a:p>
+            <a:pPr lvl="0"/>
+            <a:r>
+              <a:rPr/>
+              <a:t>Prevent regressions</a:t>
+            </a:r>
+          </a:p>
+          <a:p>
+            <a:pPr lvl="1"/>
+            <a:r>
+              <a:rPr/>
+              <a:t>Regressions are unintended side-effects created by making changes</a:t>
+            </a:r>
+          </a:p>
+          <a:p>
+            <a:pPr lvl="0"/>
+            <a:r>
+              <a:rPr/>
+              <a:t>Warns if changes are not backwards-compatible</a:t>
+            </a:r>
+          </a:p>
+        </p:txBody>
+      </p:sp>
+    </p:spTree>
+  </p:cSld>
+</p:sld>
+</file>
+
+<file path=ppt/slides/slide20.xml><?xml version="1.0" encoding="utf-8"?>
+<p:sld xmlns:a="http://schemas.openxmlformats.org/drawingml/2006/main" xmlns:r="http://schemas.openxmlformats.org/officeDocument/2006/relationships" xmlns:p="http://schemas.openxmlformats.org/presentationml/2006/main">
+  <p:cSld>
+    <p:spTree>
+      <p:nvGrpSpPr>
+        <p:cNvPr id="1" name=""/>
+        <p:cNvGrpSpPr/>
+        <p:nvPr/>
+      </p:nvGrpSpPr>
+      <p:grpSpPr>
+        <a:xfrm>
+          <a:off x="0" y="0"/>
+          <a:ext cx="0" cy="0"/>
+          <a:chOff x="0" y="0"/>
+          <a:chExt cx="0" cy="0"/>
+        </a:xfrm>
+      </p:grpSpPr>
+      <p:sp>
+        <p:nvSpPr>
+          <p:cNvPr id="2" name="Title 1"/>
+          <p:cNvSpPr>
+            <a:spLocks noGrp="1"/>
+          </p:cNvSpPr>
+          <p:nvPr>
+            <p:ph type="title"/>
+          </p:nvPr>
+        </p:nvSpPr>
+        <p:spPr/>
+        <p:txBody>
+          <a:bodyPr/>
+          <a:lstStyle/>
+          <a:p>
+            <a:pPr lvl="0" indent="0" marL="0">
+              <a:buNone/>
+            </a:pPr>
+            <a:r>
+              <a:rPr/>
+              <a:t>Interpreting the test output for monolithic tests</a:t>
+            </a:r>
+          </a:p>
+        </p:txBody>
+      </p:sp>
+      <p:sp>
+        <p:nvSpPr>
+          <p:cNvPr id="3" name="Content Placeholder 2"/>
+          <p:cNvSpPr>
+            <a:spLocks noGrp="1"/>
+          </p:cNvSpPr>
+          <p:nvPr>
+            <p:ph idx="1"/>
+          </p:nvPr>
+        </p:nvSpPr>
+        <p:spPr/>
+        <p:txBody>
+          <a:bodyPr/>
+          <a:lstStyle/>
+          <a:p>
+            <a:pPr lvl="0"/>
+            <a:r>
+              <a:rPr/>
+              <a:t>Since monolithic tests have only a pass/fail result, and there are multiple expected failures, it’s possible to miss failures</a:t>
+            </a:r>
+          </a:p>
+          <a:p>
+            <a:pPr lvl="0"/>
+            <a:r>
+              <a:rPr/>
+              <a:t>This can be mitigated by expecting a certain number of failures, or checking for specific failure messages</a:t>
+            </a:r>
+          </a:p>
+          <a:p>
+            <a:pPr lvl="1"/>
+            <a:r>
+              <a:rPr/>
+              <a:t>This would require updates to the test runner</a:t>
+            </a:r>
+          </a:p>
+        </p:txBody>
+      </p:sp>
+    </p:spTree>
+  </p:cSld>
+</p:sld>
+</file>
+
 <file path=ppt/slides/slide21.xml><?xml version="1.0" encoding="utf-8"?>
 <p:sld xmlns:a="http://schemas.openxmlformats.org/drawingml/2006/main" xmlns:r="http://schemas.openxmlformats.org/officeDocument/2006/relationships" xmlns:p="http://schemas.openxmlformats.org/presentationml/2006/main">
   <p:cSld>
@@ -4518,7 +4588,7 @@
             </a:pPr>
             <a:r>
               <a:rPr/>
-              <a:t>Interpreting the test output for monolithic tests</a:t>
+              <a:t>How many tests?</a:t>
             </a:r>
           </a:p>
         </p:txBody>
@@ -4541,21 +4611,57 @@
             <a:pPr lvl="0"/>
             <a:r>
               <a:rPr/>
-              <a:t>Since monolithic tests have only a pass/fail result, and there are multiple expected failures, it’s possible to miss failures</a:t>
-            </a:r>
-          </a:p>
-          <a:p>
-            <a:pPr lvl="0"/>
-            <a:r>
-              <a:rPr/>
-              <a:t>This can be mitigated by expecting a certain number of failures, or checking for specific failure messages</a:t>
+              <a:t>You want to have enough to thoroughly test your dictionary.</a:t>
             </a:r>
           </a:p>
           <a:p>
             <a:pPr lvl="1"/>
             <a:r>
               <a:rPr/>
-              <a:t>This would require updates to the test runner</a:t>
+              <a:t>Typically, this means that every class should be used at least once</a:t>
+            </a:r>
+          </a:p>
+          <a:p>
+            <a:pPr lvl="1"/>
+            <a:r>
+              <a:rPr/>
+              <a:t>Every schematron rule should pass and fail at least once, as well.</a:t>
+            </a:r>
+          </a:p>
+          <a:p>
+            <a:pPr lvl="0"/>
+            <a:r>
+              <a:rPr/>
+              <a:t>Too many tests can cause problems (This does </a:t>
+            </a:r>
+            <a:r>
+              <a:rPr i="1"/>
+              <a:t>not</a:t>
+            </a:r>
+            <a:r>
+              <a:rPr/>
+              <a:t> mean don’t write tests)</a:t>
+            </a:r>
+          </a:p>
+          <a:p>
+            <a:pPr lvl="1"/>
+            <a:r>
+              <a:rPr/>
+              <a:t>The biggest problem with too many tests is that they need to be maintained</a:t>
+            </a:r>
+          </a:p>
+          <a:p>
+            <a:pPr lvl="1"/>
+            <a:r>
+              <a:rPr/>
+              <a:t>Maintenance can be necessary when either your dictionary changes, or when the dependencies change (IM changes, upstream dictionaries, etc)</a:t>
+            </a:r>
+          </a:p>
+          <a:p>
+            <a:pPr lvl="1"/>
+            <a:r>
+              <a:rPr/>
+              <a:t>A test should have its own job – it shouldn’t just functionally duplicate another test</a:t>
             </a:r>
           </a:p>
         </p:txBody>
@@ -4602,7 +4708,7 @@
             </a:pPr>
             <a:r>
               <a:rPr/>
-              <a:t>How many tests?</a:t>
+              <a:t>Exercise every class</a:t>
             </a:r>
           </a:p>
         </p:txBody>
@@ -4625,57 +4731,14 @@
             <a:pPr lvl="0"/>
             <a:r>
               <a:rPr/>
-              <a:t>You want to have enough to thoroughly test your dictionary.</a:t>
-            </a:r>
-          </a:p>
-          <a:p>
-            <a:pPr lvl="1"/>
-            <a:r>
-              <a:rPr/>
-              <a:t>Typically, this means that every class should be used at least once</a:t>
-            </a:r>
-          </a:p>
-          <a:p>
-            <a:pPr lvl="1"/>
-            <a:r>
-              <a:rPr/>
-              <a:t>Every schematron rule should pass and fail at least once, as well.</a:t>
-            </a:r>
-          </a:p>
-          <a:p>
-            <a:pPr lvl="0"/>
-            <a:r>
-              <a:rPr/>
-              <a:t>Too many tests can cause problems (This does </a:t>
-            </a:r>
-            <a:r>
-              <a:rPr i="1"/>
-              <a:t>not</a:t>
-            </a:r>
-            <a:r>
-              <a:rPr/>
-              <a:t> mean don’t write tests)</a:t>
-            </a:r>
-          </a:p>
-          <a:p>
-            <a:pPr lvl="1"/>
-            <a:r>
-              <a:rPr/>
-              <a:t>The biggest problem with too many tests is that they need to be maintained</a:t>
-            </a:r>
-          </a:p>
-          <a:p>
-            <a:pPr lvl="1"/>
-            <a:r>
-              <a:rPr/>
-              <a:t>Maintenance can be necessary when either your dictionary changes, or when the dependencies change (IM changes, upstream dictionaries, etc)</a:t>
-            </a:r>
-          </a:p>
-          <a:p>
-            <a:pPr lvl="1"/>
-            <a:r>
-              <a:rPr/>
-              <a:t>A test should have its own job – it shouldn’t just functionally duplicate another test</a:t>
+              <a:t>At least one passing test should use each class</a:t>
+            </a:r>
+          </a:p>
+          <a:p>
+            <a:pPr lvl="0"/>
+            <a:r>
+              <a:rPr/>
+              <a:t>Write as many test files as necessary to achieve this.</a:t>
             </a:r>
           </a:p>
         </p:txBody>
@@ -4722,7 +4785,7 @@
             </a:pPr>
             <a:r>
               <a:rPr/>
-              <a:t>Exercise every class</a:t>
+              <a:t>Exercise every schematron rule</a:t>
             </a:r>
           </a:p>
         </p:txBody>
@@ -4745,14 +4808,28 @@
             <a:pPr lvl="0"/>
             <a:r>
               <a:rPr/>
-              <a:t>At least one passing test should use each class</a:t>
-            </a:r>
-          </a:p>
-          <a:p>
-            <a:pPr lvl="0"/>
-            <a:r>
-              <a:rPr/>
-              <a:t>Write as many test files as necessary to achieve this.</a:t>
+              <a:t>At least one invalid label test should fail each schematron rule.</a:t>
+            </a:r>
+          </a:p>
+          <a:p>
+            <a:pPr lvl="0"/>
+            <a:r>
+              <a:rPr/>
+              <a:t>At least one valid label test should pass each schematron rule</a:t>
+            </a:r>
+          </a:p>
+          <a:p>
+            <a:pPr lvl="0"/>
+            <a:r>
+              <a:rPr/>
+              <a:t>At least one valid label test should not trigger the schematron rule, if possible.</a:t>
+            </a:r>
+          </a:p>
+          <a:p>
+            <a:pPr lvl="0"/>
+            <a:r>
+              <a:rPr/>
+              <a:t>This is especially important, since schematron rules can be prevented from triggering if incorrectly written.</a:t>
             </a:r>
           </a:p>
         </p:txBody>
@@ -4789,97 +4866,6 @@
             <p:ph type="title"/>
           </p:nvPr>
         </p:nvSpPr>
-        <p:spPr/>
-        <p:txBody>
-          <a:bodyPr/>
-          <a:lstStyle/>
-          <a:p>
-            <a:pPr lvl="0" indent="0" marL="0">
-              <a:buNone/>
-            </a:pPr>
-            <a:r>
-              <a:rPr/>
-              <a:t>Exercise every schematron rule</a:t>
-            </a:r>
-          </a:p>
-        </p:txBody>
-      </p:sp>
-      <p:sp>
-        <p:nvSpPr>
-          <p:cNvPr id="3" name="Content Placeholder 2"/>
-          <p:cNvSpPr>
-            <a:spLocks noGrp="1"/>
-          </p:cNvSpPr>
-          <p:nvPr>
-            <p:ph idx="1"/>
-          </p:nvPr>
-        </p:nvSpPr>
-        <p:spPr/>
-        <p:txBody>
-          <a:bodyPr/>
-          <a:lstStyle/>
-          <a:p>
-            <a:pPr lvl="0"/>
-            <a:r>
-              <a:rPr/>
-              <a:t>At least one invalid label test should fail each schematron rule.</a:t>
-            </a:r>
-          </a:p>
-          <a:p>
-            <a:pPr lvl="0"/>
-            <a:r>
-              <a:rPr/>
-              <a:t>At least one valid label test should pass each schematron rule</a:t>
-            </a:r>
-          </a:p>
-          <a:p>
-            <a:pPr lvl="0"/>
-            <a:r>
-              <a:rPr/>
-              <a:t>At least one valid label test should not trigger the schematron rule, if possible.</a:t>
-            </a:r>
-          </a:p>
-          <a:p>
-            <a:pPr lvl="0"/>
-            <a:r>
-              <a:rPr/>
-              <a:t>This is especially important, since schematron rules can be prevented from triggering if incorrectly written.</a:t>
-            </a:r>
-          </a:p>
-        </p:txBody>
-      </p:sp>
-    </p:spTree>
-  </p:cSld>
-</p:sld>
-</file>
-
-<file path=ppt/slides/slide25.xml><?xml version="1.0" encoding="utf-8"?>
-<p:sld xmlns:a="http://schemas.openxmlformats.org/drawingml/2006/main" xmlns:r="http://schemas.openxmlformats.org/officeDocument/2006/relationships" xmlns:p="http://schemas.openxmlformats.org/presentationml/2006/main">
-  <p:cSld>
-    <p:spTree>
-      <p:nvGrpSpPr>
-        <p:cNvPr id="1" name=""/>
-        <p:cNvGrpSpPr/>
-        <p:nvPr/>
-      </p:nvGrpSpPr>
-      <p:grpSpPr>
-        <a:xfrm>
-          <a:off x="0" y="0"/>
-          <a:ext cx="0" cy="0"/>
-          <a:chOff x="0" y="0"/>
-          <a:chExt cx="0" cy="0"/>
-        </a:xfrm>
-      </p:grpSpPr>
-      <p:sp>
-        <p:nvSpPr>
-          <p:cNvPr id="2" name="Title 1"/>
-          <p:cNvSpPr>
-            <a:spLocks noGrp="1"/>
-          </p:cNvSpPr>
-          <p:nvPr>
-            <p:ph type="title"/>
-          </p:nvPr>
-        </p:nvSpPr>
         <p:spPr>
           <a:xfrm>
             <a:off x="457201" y="204787"/>
@@ -4923,6 +4909,25 @@
                 <a:hlinkClick r:id="rId2"/>
               </a:rPr>
               <a:t>https://github.com/pds-data-dictionaries/ldd-nucspec/tree/main/test</a:t>
+            </a:r>
+          </a:p>
+          <a:p>
+            <a:pPr lvl="0" indent="0" marL="0">
+              <a:spcBef>
+                <a:spcPts val="3000"/>
+              </a:spcBef>
+              <a:buNone/>
+            </a:pPr>
+            <a:r>
+              <a:rPr b="1"/>
+              <a:t>Objectives</a:t>
+            </a:r>
+          </a:p>
+          <a:p>
+            <a:pPr lvl="0"/>
+            <a:r>
+              <a:rPr/>
+              <a:t>Demonstrate tests for each schematron rule</a:t>
             </a:r>
           </a:p>
         </p:txBody>
@@ -4992,6 +4997,97 @@
 </p:sld>
 </file>
 
+<file path=ppt/slides/slide25.xml><?xml version="1.0" encoding="utf-8"?>
+<p:sld xmlns:a="http://schemas.openxmlformats.org/drawingml/2006/main" xmlns:r="http://schemas.openxmlformats.org/officeDocument/2006/relationships" xmlns:p="http://schemas.openxmlformats.org/presentationml/2006/main">
+  <p:cSld>
+    <p:spTree>
+      <p:nvGrpSpPr>
+        <p:cNvPr id="1" name=""/>
+        <p:cNvGrpSpPr/>
+        <p:nvPr/>
+      </p:nvGrpSpPr>
+      <p:grpSpPr>
+        <a:xfrm>
+          <a:off x="0" y="0"/>
+          <a:ext cx="0" cy="0"/>
+          <a:chOff x="0" y="0"/>
+          <a:chExt cx="0" cy="0"/>
+        </a:xfrm>
+      </p:grpSpPr>
+      <p:sp>
+        <p:nvSpPr>
+          <p:cNvPr id="2" name="Title 1"/>
+          <p:cNvSpPr>
+            <a:spLocks noGrp="1"/>
+          </p:cNvSpPr>
+          <p:nvPr>
+            <p:ph type="title"/>
+          </p:nvPr>
+        </p:nvSpPr>
+        <p:spPr/>
+        <p:txBody>
+          <a:bodyPr/>
+          <a:lstStyle/>
+          <a:p>
+            <a:pPr lvl="0" indent="0" marL="0">
+              <a:buNone/>
+            </a:pPr>
+            <a:r>
+              <a:rPr/>
+              <a:t>Document the tests</a:t>
+            </a:r>
+          </a:p>
+        </p:txBody>
+      </p:sp>
+      <p:sp>
+        <p:nvSpPr>
+          <p:cNvPr id="3" name="Content Placeholder 2"/>
+          <p:cNvSpPr>
+            <a:spLocks noGrp="1"/>
+          </p:cNvSpPr>
+          <p:nvPr>
+            <p:ph idx="1"/>
+          </p:nvPr>
+        </p:nvSpPr>
+        <p:spPr/>
+        <p:txBody>
+          <a:bodyPr/>
+          <a:lstStyle/>
+          <a:p>
+            <a:pPr lvl="0"/>
+            <a:r>
+              <a:rPr/>
+              <a:t>Documentation can be as simple as a file that lists the test name and what it is testing.</a:t>
+            </a:r>
+          </a:p>
+          <a:p>
+            <a:pPr lvl="0"/>
+            <a:r>
+              <a:rPr/>
+              <a:t>This will remind you how each test is expected to fail, or what each test is intended to exercise.</a:t>
+            </a:r>
+          </a:p>
+          <a:p>
+            <a:pPr lvl="0"/>
+            <a:r>
+              <a:rPr/>
+              <a:t>If writing a monolithic test, this can be further developed into the expected output for comparison in a future version of the EN testing tool.</a:t>
+            </a:r>
+          </a:p>
+          <a:p>
+            <a:pPr lvl="0"/>
+            <a:r>
+              <a:rPr/>
+              <a:t>Documentation can also be written inline. It would be valuable to note precisely which line should fail.</a:t>
+            </a:r>
+          </a:p>
+        </p:txBody>
+      </p:sp>
+    </p:spTree>
+  </p:cSld>
+</p:sld>
+</file>
+
 <file path=ppt/slides/slide26.xml><?xml version="1.0" encoding="utf-8"?>
 <p:sld xmlns:a="http://schemas.openxmlformats.org/drawingml/2006/main" xmlns:r="http://schemas.openxmlformats.org/officeDocument/2006/relationships" xmlns:p="http://schemas.openxmlformats.org/presentationml/2006/main">
   <p:cSld>
@@ -5011,6 +5107,31 @@
       </p:grpSpPr>
       <p:sp>
         <p:nvSpPr>
+          <p:cNvPr id="2" name="Title 1"/>
+          <p:cNvSpPr>
+            <a:spLocks noGrp="1"/>
+          </p:cNvSpPr>
+          <p:nvPr>
+            <p:ph type="title"/>
+          </p:nvPr>
+        </p:nvSpPr>
+        <p:spPr/>
+        <p:txBody>
+          <a:bodyPr/>
+          <a:lstStyle/>
+          <a:p>
+            <a:pPr lvl="0" indent="0" marL="0">
+              <a:buNone/>
+            </a:pPr>
+            <a:r>
+              <a:rPr/>
+              <a:t>Organize the tests</a:t>
+            </a:r>
+          </a:p>
+        </p:txBody>
+      </p:sp>
+      <p:sp>
+        <p:nvSpPr>
           <p:cNvPr id="3" name="Content Placeholder 2"/>
           <p:cNvSpPr>
             <a:spLocks noGrp="1"/>
@@ -5025,21 +5146,11 @@
           <a:lstStyle/>
           <a:p>
             <a:pPr lvl="0" indent="0" marL="0">
-              <a:spcBef>
-                <a:spcPts val="3000"/>
-              </a:spcBef>
               <a:buNone/>
             </a:pPr>
             <a:r>
-              <a:rPr b="1"/>
-              <a:t>Objectives</a:t>
-            </a:r>
-          </a:p>
-          <a:p>
-            <a:pPr lvl="0"/>
-            <a:r>
-              <a:rPr/>
-              <a:t>Demonstrate tests for each schematron rule</a:t>
+              <a:rPr/>
+              <a:t>At minimum, tests should be organized into valid and invalid label tests. Although this is embedded in the name, sorting them will make it easier to find the test that you need, especially as the number of tests grows.</a:t>
             </a:r>
           </a:p>
         </p:txBody>
@@ -5086,7 +5197,7 @@
             </a:pPr>
             <a:r>
               <a:rPr/>
-              <a:t>Document the tests</a:t>
+              <a:t>Static analysis tools</a:t>
             </a:r>
           </a:p>
         </p:txBody>
@@ -5109,28 +5220,49 @@
             <a:pPr lvl="0"/>
             <a:r>
               <a:rPr/>
-              <a:t>Documentation can be as simple as a file that lists the test name and what it is testing.</a:t>
-            </a:r>
-          </a:p>
-          <a:p>
-            <a:pPr lvl="0"/>
-            <a:r>
-              <a:rPr/>
-              <a:t>This will remind you how each test is expected to fail, or what each test is intended to exercise.</a:t>
-            </a:r>
-          </a:p>
-          <a:p>
-            <a:pPr lvl="0"/>
-            <a:r>
-              <a:rPr/>
-              <a:t>If writing a monolithic test, this can be further developed into the expected output for comparison in a future version of the EN testing tool.</a:t>
-            </a:r>
-          </a:p>
-          <a:p>
-            <a:pPr lvl="0"/>
-            <a:r>
-              <a:rPr/>
-              <a:t>Documentation can also be written inline. It would be valuable to note precisely which line should fail.</a:t>
+              <a:t>Validate tool</a:t>
+            </a:r>
+          </a:p>
+          <a:p>
+            <a:pPr lvl="1"/>
+            <a:r>
+              <a:rPr/>
+              <a:t>Ingest LDD files are part of the PDS4 information model, just like products. This means that the validator can run against them.</a:t>
+            </a:r>
+          </a:p>
+          <a:p>
+            <a:pPr lvl="0"/>
+            <a:r>
+              <a:rPr/>
+              <a:t>LDDTool</a:t>
+            </a:r>
+          </a:p>
+          <a:p>
+            <a:pPr lvl="1"/>
+            <a:r>
+              <a:rPr/>
+              <a:t>Catches many problems with a dictionary while it is being generated.</a:t>
+            </a:r>
+          </a:p>
+          <a:p>
+            <a:pPr lvl="0"/>
+            <a:r>
+              <a:rPr/>
+              <a:t>LDDPreflight</a:t>
+            </a:r>
+          </a:p>
+          <a:p>
+            <a:pPr lvl="1"/>
+            <a:r>
+              <a:rPr/>
+              <a:t>Runs several of the new rules proposed at this meeting, and raises any voilations.</a:t>
+            </a:r>
+          </a:p>
+          <a:p>
+            <a:pPr lvl="0"/>
+            <a:r>
+              <a:rPr/>
+              <a:t>These should be run before the regression tests, since errors at this point are easier to catch, and some of them will prevent the dictionary from being generated, or will prevent regression tests from passing.</a:t>
             </a:r>
           </a:p>
         </p:txBody>
@@ -5167,302 +5299,6 @@
             <p:ph type="title"/>
           </p:nvPr>
         </p:nvSpPr>
-        <p:spPr/>
-        <p:txBody>
-          <a:bodyPr/>
-          <a:lstStyle/>
-          <a:p>
-            <a:pPr lvl="0" indent="0" marL="0">
-              <a:buNone/>
-            </a:pPr>
-            <a:r>
-              <a:rPr/>
-              <a:t>Organize the tests</a:t>
-            </a:r>
-          </a:p>
-        </p:txBody>
-      </p:sp>
-      <p:sp>
-        <p:nvSpPr>
-          <p:cNvPr id="3" name="Content Placeholder 2"/>
-          <p:cNvSpPr>
-            <a:spLocks noGrp="1"/>
-          </p:cNvSpPr>
-          <p:nvPr>
-            <p:ph idx="1"/>
-          </p:nvPr>
-        </p:nvSpPr>
-        <p:spPr/>
-        <p:txBody>
-          <a:bodyPr/>
-          <a:lstStyle/>
-          <a:p>
-            <a:pPr lvl="0" indent="0" marL="0">
-              <a:buNone/>
-            </a:pPr>
-            <a:r>
-              <a:rPr/>
-              <a:t>At minimum, tests should be organized into valid and invalid label tests. Although this is embedded in the name, sorting them will make it easier to find the test that you need, especially as the number of tests grows.</a:t>
-            </a:r>
-          </a:p>
-        </p:txBody>
-      </p:sp>
-    </p:spTree>
-  </p:cSld>
-</p:sld>
-</file>
-
-<file path=ppt/slides/slide29.xml><?xml version="1.0" encoding="utf-8"?>
-<p:sld xmlns:a="http://schemas.openxmlformats.org/drawingml/2006/main" xmlns:r="http://schemas.openxmlformats.org/officeDocument/2006/relationships" xmlns:p="http://schemas.openxmlformats.org/presentationml/2006/main">
-  <p:cSld>
-    <p:spTree>
-      <p:nvGrpSpPr>
-        <p:cNvPr id="1" name=""/>
-        <p:cNvGrpSpPr/>
-        <p:nvPr/>
-      </p:nvGrpSpPr>
-      <p:grpSpPr>
-        <a:xfrm>
-          <a:off x="0" y="0"/>
-          <a:ext cx="0" cy="0"/>
-          <a:chOff x="0" y="0"/>
-          <a:chExt cx="0" cy="0"/>
-        </a:xfrm>
-      </p:grpSpPr>
-      <p:sp>
-        <p:nvSpPr>
-          <p:cNvPr id="2" name="Title 1"/>
-          <p:cNvSpPr>
-            <a:spLocks noGrp="1"/>
-          </p:cNvSpPr>
-          <p:nvPr>
-            <p:ph type="title"/>
-          </p:nvPr>
-        </p:nvSpPr>
-        <p:spPr/>
-        <p:txBody>
-          <a:bodyPr/>
-          <a:lstStyle/>
-          <a:p>
-            <a:pPr lvl="0" indent="0" marL="0">
-              <a:buNone/>
-            </a:pPr>
-            <a:r>
-              <a:rPr/>
-              <a:t>Static analysis tools</a:t>
-            </a:r>
-          </a:p>
-        </p:txBody>
-      </p:sp>
-      <p:sp>
-        <p:nvSpPr>
-          <p:cNvPr id="3" name="Content Placeholder 2"/>
-          <p:cNvSpPr>
-            <a:spLocks noGrp="1"/>
-          </p:cNvSpPr>
-          <p:nvPr>
-            <p:ph idx="1"/>
-          </p:nvPr>
-        </p:nvSpPr>
-        <p:spPr/>
-        <p:txBody>
-          <a:bodyPr/>
-          <a:lstStyle/>
-          <a:p>
-            <a:pPr lvl="0"/>
-            <a:r>
-              <a:rPr/>
-              <a:t>Validate tool</a:t>
-            </a:r>
-          </a:p>
-          <a:p>
-            <a:pPr lvl="1"/>
-            <a:r>
-              <a:rPr/>
-              <a:t>Ingest LDD files are part of the PDS4 information model, just like products. This means that the validator can run against them.</a:t>
-            </a:r>
-          </a:p>
-          <a:p>
-            <a:pPr lvl="0"/>
-            <a:r>
-              <a:rPr/>
-              <a:t>LDDTool</a:t>
-            </a:r>
-          </a:p>
-          <a:p>
-            <a:pPr lvl="1"/>
-            <a:r>
-              <a:rPr/>
-              <a:t>Catches many problems with a dictionary while it is being generated.</a:t>
-            </a:r>
-          </a:p>
-          <a:p>
-            <a:pPr lvl="0"/>
-            <a:r>
-              <a:rPr/>
-              <a:t>LDDPreflight</a:t>
-            </a:r>
-          </a:p>
-          <a:p>
-            <a:pPr lvl="1"/>
-            <a:r>
-              <a:rPr/>
-              <a:t>Runs several of the new rules proposed at this meeting, and raises any voilations.</a:t>
-            </a:r>
-          </a:p>
-          <a:p>
-            <a:pPr lvl="0"/>
-            <a:r>
-              <a:rPr/>
-              <a:t>These should be run before the regression tests, since errors at this point are easier to catch, and some of them will prevent the dictionary from being generated, or will prevent regression tests from passing.</a:t>
-            </a:r>
-          </a:p>
-        </p:txBody>
-      </p:sp>
-    </p:spTree>
-  </p:cSld>
-</p:sld>
-</file>
-
-<file path=ppt/slides/slide3.xml><?xml version="1.0" encoding="utf-8"?>
-<p:sld xmlns:a="http://schemas.openxmlformats.org/drawingml/2006/main" xmlns:r="http://schemas.openxmlformats.org/officeDocument/2006/relationships" xmlns:p="http://schemas.openxmlformats.org/presentationml/2006/main">
-  <p:cSld>
-    <p:spTree>
-      <p:nvGrpSpPr>
-        <p:cNvPr id="1" name=""/>
-        <p:cNvGrpSpPr/>
-        <p:nvPr/>
-      </p:nvGrpSpPr>
-      <p:grpSpPr>
-        <a:xfrm>
-          <a:off x="0" y="0"/>
-          <a:ext cx="0" cy="0"/>
-          <a:chOff x="0" y="0"/>
-          <a:chExt cx="0" cy="0"/>
-        </a:xfrm>
-      </p:grpSpPr>
-      <p:sp>
-        <p:nvSpPr>
-          <p:cNvPr id="2" name="Title 1"/>
-          <p:cNvSpPr>
-            <a:spLocks noGrp="1"/>
-          </p:cNvSpPr>
-          <p:nvPr>
-            <p:ph type="title"/>
-          </p:nvPr>
-        </p:nvSpPr>
-        <p:spPr/>
-        <p:txBody>
-          <a:bodyPr/>
-          <a:lstStyle/>
-          <a:p>
-            <a:pPr lvl="0" indent="0" marL="0">
-              <a:buNone/>
-            </a:pPr>
-            <a:r>
-              <a:rPr/>
-              <a:t>Testing methodologies</a:t>
-            </a:r>
-          </a:p>
-        </p:txBody>
-      </p:sp>
-      <p:sp>
-        <p:nvSpPr>
-          <p:cNvPr id="3" name="Content Placeholder 2"/>
-          <p:cNvSpPr>
-            <a:spLocks noGrp="1"/>
-          </p:cNvSpPr>
-          <p:nvPr>
-            <p:ph idx="1"/>
-          </p:nvPr>
-        </p:nvSpPr>
-        <p:spPr/>
-        <p:txBody>
-          <a:bodyPr/>
-          <a:lstStyle/>
-          <a:p>
-            <a:pPr lvl="0"/>
-            <a:r>
-              <a:rPr/>
-              <a:t>Regression testing</a:t>
-            </a:r>
-          </a:p>
-          <a:p>
-            <a:pPr lvl="1"/>
-            <a:r>
-              <a:rPr/>
-              <a:t>This method generates the dictionary, and validates special labels against the dictionary.</a:t>
-            </a:r>
-          </a:p>
-          <a:p>
-            <a:pPr lvl="2"/>
-            <a:r>
-              <a:rPr/>
-              <a:t>Thse labels are specifically designed to pass or fail validation</a:t>
-            </a:r>
-          </a:p>
-          <a:p>
-            <a:pPr lvl="2"/>
-            <a:r>
-              <a:rPr/>
-              <a:t>If the validation result does not match the intent of the label, then there is a problem with the dictionary.</a:t>
-            </a:r>
-          </a:p>
-          <a:p>
-            <a:pPr lvl="0"/>
-            <a:r>
-              <a:rPr/>
-              <a:t>Static analysis</a:t>
-            </a:r>
-          </a:p>
-          <a:p>
-            <a:pPr lvl="1"/>
-            <a:r>
-              <a:rPr/>
-              <a:t>This evaluates the dictionary according to predefined rules, without necessarily comparing it against labels.</a:t>
-            </a:r>
-          </a:p>
-          <a:p>
-            <a:pPr lvl="0"/>
-            <a:r>
-              <a:rPr/>
-              <a:t>Regression testing and static analysis are complementary tools, and both are needed to fully evaluate a dictionary.</a:t>
-            </a:r>
-          </a:p>
-        </p:txBody>
-      </p:sp>
-    </p:spTree>
-  </p:cSld>
-</p:sld>
-</file>
-
-<file path=ppt/slides/slide30.xml><?xml version="1.0" encoding="utf-8"?>
-<p:sld xmlns:a="http://schemas.openxmlformats.org/drawingml/2006/main" xmlns:r="http://schemas.openxmlformats.org/officeDocument/2006/relationships" xmlns:p="http://schemas.openxmlformats.org/presentationml/2006/main">
-  <p:cSld>
-    <p:spTree>
-      <p:nvGrpSpPr>
-        <p:cNvPr id="1" name=""/>
-        <p:cNvGrpSpPr/>
-        <p:nvPr/>
-      </p:nvGrpSpPr>
-      <p:grpSpPr>
-        <a:xfrm>
-          <a:off x="0" y="0"/>
-          <a:ext cx="0" cy="0"/>
-          <a:chOff x="0" y="0"/>
-          <a:chExt cx="0" cy="0"/>
-        </a:xfrm>
-      </p:grpSpPr>
-      <p:sp>
-        <p:nvSpPr>
-          <p:cNvPr id="2" name="Title 1"/>
-          <p:cNvSpPr>
-            <a:spLocks noGrp="1"/>
-          </p:cNvSpPr>
-          <p:nvPr>
-            <p:ph type="title"/>
-          </p:nvPr>
-        </p:nvSpPr>
         <p:spPr>
           <a:xfrm>
             <a:off x="457201" y="204787"/>
@@ -5497,6 +5333,25 @@
         <p:txBody>
           <a:bodyPr/>
           <a:lstStyle/>
+          <a:p>
+            <a:pPr lvl="0" indent="0" marL="0">
+              <a:spcBef>
+                <a:spcPts val="3000"/>
+              </a:spcBef>
+              <a:buNone/>
+            </a:pPr>
+            <a:r>
+              <a:rPr b="1"/>
+              <a:t>Objectives</a:t>
+            </a:r>
+          </a:p>
+          <a:p>
+            <a:pPr lvl="0"/>
+            <a:r>
+              <a:rPr/>
+              <a:t>Demonstrate using a tool to check for common problems that can be caught without regression tests.</a:t>
+            </a:r>
+          </a:p>
           <a:p>
             <a:pPr lvl="0" indent="0" marL="0">
               <a:buNone/>
@@ -5575,7 +5430,7 @@
 </p:sld>
 </file>
 
-<file path=ppt/slides/slide31.xml><?xml version="1.0" encoding="utf-8"?>
+<file path=ppt/slides/slide29.xml><?xml version="1.0" encoding="utf-8"?>
 <p:sld xmlns:a="http://schemas.openxmlformats.org/drawingml/2006/main" xmlns:r="http://schemas.openxmlformats.org/officeDocument/2006/relationships" xmlns:p="http://schemas.openxmlformats.org/presentationml/2006/main">
   <p:cSld>
     <p:spTree>
@@ -5726,7 +5581,119 @@
 </p:sld>
 </file>
 
-<file path=ppt/slides/slide32.xml><?xml version="1.0" encoding="utf-8"?>
+<file path=ppt/slides/slide3.xml><?xml version="1.0" encoding="utf-8"?>
+<p:sld xmlns:a="http://schemas.openxmlformats.org/drawingml/2006/main" xmlns:r="http://schemas.openxmlformats.org/officeDocument/2006/relationships" xmlns:p="http://schemas.openxmlformats.org/presentationml/2006/main">
+  <p:cSld>
+    <p:spTree>
+      <p:nvGrpSpPr>
+        <p:cNvPr id="1" name=""/>
+        <p:cNvGrpSpPr/>
+        <p:nvPr/>
+      </p:nvGrpSpPr>
+      <p:grpSpPr>
+        <a:xfrm>
+          <a:off x="0" y="0"/>
+          <a:ext cx="0" cy="0"/>
+          <a:chOff x="0" y="0"/>
+          <a:chExt cx="0" cy="0"/>
+        </a:xfrm>
+      </p:grpSpPr>
+      <p:sp>
+        <p:nvSpPr>
+          <p:cNvPr id="2" name="Title 1"/>
+          <p:cNvSpPr>
+            <a:spLocks noGrp="1"/>
+          </p:cNvSpPr>
+          <p:nvPr>
+            <p:ph type="title"/>
+          </p:nvPr>
+        </p:nvSpPr>
+        <p:spPr/>
+        <p:txBody>
+          <a:bodyPr/>
+          <a:lstStyle/>
+          <a:p>
+            <a:pPr lvl="0" indent="0" marL="0">
+              <a:buNone/>
+            </a:pPr>
+            <a:r>
+              <a:rPr/>
+              <a:t>Testing methodologies</a:t>
+            </a:r>
+          </a:p>
+        </p:txBody>
+      </p:sp>
+      <p:sp>
+        <p:nvSpPr>
+          <p:cNvPr id="3" name="Content Placeholder 2"/>
+          <p:cNvSpPr>
+            <a:spLocks noGrp="1"/>
+          </p:cNvSpPr>
+          <p:nvPr>
+            <p:ph idx="1"/>
+          </p:nvPr>
+        </p:nvSpPr>
+        <p:spPr/>
+        <p:txBody>
+          <a:bodyPr/>
+          <a:lstStyle/>
+          <a:p>
+            <a:pPr lvl="0"/>
+            <a:r>
+              <a:rPr/>
+              <a:t>Regression testing</a:t>
+            </a:r>
+          </a:p>
+          <a:p>
+            <a:pPr lvl="1"/>
+            <a:r>
+              <a:rPr/>
+              <a:t>This method generates the dictionary, and validates special labels against the dictionary.</a:t>
+            </a:r>
+          </a:p>
+          <a:p>
+            <a:pPr lvl="2"/>
+            <a:r>
+              <a:rPr/>
+              <a:t>Thse labels are specifically designed to pass or fail validation</a:t>
+            </a:r>
+          </a:p>
+          <a:p>
+            <a:pPr lvl="2"/>
+            <a:r>
+              <a:rPr/>
+              <a:t>If the validation result does not match the intent of the label, then there is a problem with the dictionary.</a:t>
+            </a:r>
+          </a:p>
+          <a:p>
+            <a:pPr lvl="0"/>
+            <a:r>
+              <a:rPr/>
+              <a:t>Static analysis</a:t>
+            </a:r>
+          </a:p>
+          <a:p>
+            <a:pPr lvl="1"/>
+            <a:r>
+              <a:rPr/>
+              <a:t>This evaluates the dictionary according to predefined rules, without necessarily comparing it against labels.</a:t>
+            </a:r>
+          </a:p>
+          <a:p>
+            <a:pPr lvl="0"/>
+            <a:r>
+              <a:rPr/>
+              <a:t>Regression testing and static analysis are complementary tools, and both are needed to fully evaluate a dictionary.</a:t>
+            </a:r>
+          </a:p>
+        </p:txBody>
+      </p:sp>
+    </p:spTree>
+  </p:cSld>
+</p:sld>
+</file>
+
+<file path=ppt/slides/slide30.xml><?xml version="1.0" encoding="utf-8"?>
 <p:sld xmlns:a="http://schemas.openxmlformats.org/drawingml/2006/main" xmlns:r="http://schemas.openxmlformats.org/officeDocument/2006/relationships" xmlns:p="http://schemas.openxmlformats.org/presentationml/2006/main">
   <p:cSld>
     <p:spTree>

</xml_diff>